<commit_message>
Made edits based on Wunmi and Ikenna's feedback
</commit_message>
<xml_diff>
--- a/Documentation/Wireframes/CashPool_CardDeposit.pptx
+++ b/Documentation/Wireframes/CashPool_CardDeposit.pptx
@@ -246,7 +246,7 @@
           <a:p>
             <a:fld id="{71AC5D09-1254-4553-8506-F9EC30576ABC}" type="datetimeFigureOut">
               <a:rPr lang="en-US" smtClean="0"/>
-              <a:t>8/19/2014</a:t>
+              <a:t>8/23/2014</a:t>
             </a:fld>
             <a:endParaRPr lang="en-US"/>
           </a:p>
@@ -4015,14 +4015,14 @@
           <p:nvPr>
             <p:extLst>
               <p:ext uri="{D42A27DB-BD31-4B8C-83A1-F6EECF244321}">
-                <p14:modId xmlns:p14="http://schemas.microsoft.com/office/powerpoint/2010/main" val="214301627"/>
+                <p14:modId xmlns:p14="http://schemas.microsoft.com/office/powerpoint/2010/main" val="1417509446"/>
               </p:ext>
             </p:extLst>
           </p:nvPr>
         </p:nvGraphicFramePr>
         <p:xfrm>
           <a:off x="179512" y="862032"/>
-          <a:ext cx="1512168" cy="5648960"/>
+          <a:ext cx="1512168" cy="5933440"/>
         </p:xfrm>
         <a:graphic>
           <a:graphicData uri="http://schemas.openxmlformats.org/drawingml/2006/table">
@@ -4055,14 +4055,14 @@
                     <a:lstStyle/>
                     <a:p>
                       <a:r>
-                        <a:rPr lang="en-US" sz="1200" dirty="0" smtClean="0"/>
+                        <a:rPr lang="en-US" sz="1000" dirty="0" smtClean="0"/>
                         <a:t>+ Cash</a:t>
                       </a:r>
                       <a:r>
-                        <a:rPr lang="en-US" sz="1200" baseline="0" dirty="0" smtClean="0"/>
+                        <a:rPr lang="en-US" sz="1000" baseline="0" dirty="0" smtClean="0"/>
                         <a:t> Pool</a:t>
                       </a:r>
-                      <a:endParaRPr lang="en-US" sz="1200" dirty="0" smtClean="0"/>
+                      <a:endParaRPr lang="en-US" sz="1000" dirty="0" smtClean="0"/>
                     </a:p>
                   </a:txBody>
                   <a:tcPr/>
@@ -4076,7 +4076,7 @@
                     <a:p>
                       <a:pPr algn="r"/>
                       <a:r>
-                        <a:rPr lang="en-US" sz="1200" dirty="0" smtClean="0"/>
+                        <a:rPr lang="en-US" sz="1000" dirty="0" smtClean="0"/>
                         <a:t>GT Bank</a:t>
                       </a:r>
                     </a:p>
@@ -4092,7 +4092,7 @@
                     <a:p>
                       <a:pPr algn="r"/>
                       <a:r>
-                        <a:rPr lang="en-US" sz="1200" dirty="0" smtClean="0"/>
+                        <a:rPr lang="en-US" sz="1000" dirty="0" smtClean="0"/>
                         <a:t>Skye</a:t>
                       </a:r>
                     </a:p>
@@ -4108,7 +4108,7 @@
                     <a:p>
                       <a:pPr algn="r"/>
                       <a:r>
-                        <a:rPr lang="en-US" sz="1200" dirty="0" smtClean="0"/>
+                        <a:rPr lang="en-US" sz="1000" dirty="0" smtClean="0"/>
                         <a:t>First Bank</a:t>
                       </a:r>
                     </a:p>
@@ -4124,7 +4124,7 @@
                     <a:p>
                       <a:pPr algn="r"/>
                       <a:r>
-                        <a:rPr lang="en-US" sz="1200" dirty="0" smtClean="0"/>
+                        <a:rPr lang="en-US" sz="1000" dirty="0" smtClean="0"/>
                         <a:t>UBA</a:t>
                       </a:r>
                     </a:p>
@@ -4140,7 +4140,7 @@
                     <a:p>
                       <a:pPr algn="r"/>
                       <a:r>
-                        <a:rPr lang="en-US" sz="1200" dirty="0" smtClean="0"/>
+                        <a:rPr lang="en-US" sz="1000" dirty="0" smtClean="0"/>
                         <a:t>Zenith</a:t>
                       </a:r>
                     </a:p>
@@ -4156,7 +4156,7 @@
                     <a:p>
                       <a:pPr algn="r"/>
                       <a:r>
-                        <a:rPr lang="en-US" sz="1200" dirty="0" smtClean="0"/>
+                        <a:rPr lang="en-US" sz="1000" dirty="0" smtClean="0"/>
                         <a:t>FCMB</a:t>
                       </a:r>
                     </a:p>
@@ -4172,14 +4172,14 @@
                     <a:p>
                       <a:pPr algn="r"/>
                       <a:r>
-                        <a:rPr lang="en-US" sz="1200" dirty="0" smtClean="0"/>
+                        <a:rPr lang="en-US" sz="1000" dirty="0" smtClean="0"/>
                         <a:t>Diamond</a:t>
                       </a:r>
                       <a:r>
-                        <a:rPr lang="en-US" sz="1200" baseline="0" dirty="0" smtClean="0"/>
+                        <a:rPr lang="en-US" sz="1000" baseline="0" dirty="0" smtClean="0"/>
                         <a:t> Bank</a:t>
                       </a:r>
-                      <a:endParaRPr lang="en-US" sz="1200" dirty="0" smtClean="0"/>
+                      <a:endParaRPr lang="en-US" sz="1000" dirty="0" smtClean="0"/>
                     </a:p>
                   </a:txBody>
                   <a:tcPr/>
@@ -4191,10 +4191,12 @@
                     <a:bodyPr/>
                     <a:lstStyle/>
                     <a:p>
-                      <a:r>
-                        <a:rPr lang="en-US" sz="1200" dirty="0" smtClean="0"/>
-                        <a:t>+ Card Deposits</a:t>
-                      </a:r>
+                      <a:pPr algn="r"/>
+                      <a:r>
+                        <a:rPr lang="en-US" sz="1000" dirty="0" smtClean="0"/>
+                        <a:t>Access Bank</a:t>
+                      </a:r>
+                      <a:endParaRPr lang="en-US" sz="1000" dirty="0" smtClean="0"/>
                     </a:p>
                   </a:txBody>
                   <a:tcPr/>
@@ -4206,12 +4208,10 @@
                     <a:bodyPr/>
                     <a:lstStyle/>
                     <a:p>
-                      <a:pPr algn="r"/>
-                      <a:r>
-                        <a:rPr lang="en-US" sz="1200" dirty="0" err="1" smtClean="0"/>
-                        <a:t>InterSwitch</a:t>
-                      </a:r>
-                      <a:endParaRPr lang="en-US" sz="1200" dirty="0" smtClean="0"/>
+                      <a:r>
+                        <a:rPr lang="en-US" sz="1000" dirty="0" smtClean="0"/>
+                        <a:t>+ Card Deposits</a:t>
+                      </a:r>
                     </a:p>
                   </a:txBody>
                   <a:tcPr/>
@@ -4223,10 +4223,12 @@
                     <a:bodyPr/>
                     <a:lstStyle/>
                     <a:p>
-                      <a:r>
-                        <a:rPr lang="en-US" sz="1200" dirty="0" smtClean="0"/>
-                        <a:t>+ Airtime</a:t>
-                      </a:r>
+                      <a:pPr algn="r"/>
+                      <a:r>
+                        <a:rPr lang="en-US" sz="1000" dirty="0" err="1" smtClean="0"/>
+                        <a:t>InterSwitch</a:t>
+                      </a:r>
+                      <a:endParaRPr lang="en-US" sz="1000" dirty="0" smtClean="0"/>
                     </a:p>
                   </a:txBody>
                   <a:tcPr/>
@@ -4238,16 +4240,10 @@
                     <a:bodyPr/>
                     <a:lstStyle/>
                     <a:p>
-                      <a:pPr algn="r"/>
-                      <a:r>
-                        <a:rPr lang="en-US" sz="1200" dirty="0" smtClean="0"/>
-                        <a:t>Each Mobile</a:t>
-                      </a:r>
-                      <a:r>
-                        <a:rPr lang="en-US" sz="1200" baseline="0" dirty="0" smtClean="0"/>
-                        <a:t> Operator</a:t>
-                      </a:r>
-                      <a:endParaRPr lang="en-US" sz="1200" dirty="0" smtClean="0"/>
+                      <a:r>
+                        <a:rPr lang="en-US" sz="1000" dirty="0" smtClean="0"/>
+                        <a:t>+ Airtime</a:t>
+                      </a:r>
                     </a:p>
                   </a:txBody>
                   <a:tcPr/>
@@ -4259,11 +4255,16 @@
                     <a:bodyPr/>
                     <a:lstStyle/>
                     <a:p>
-                      <a:pPr algn="l"/>
-                      <a:r>
-                        <a:rPr lang="en-US" sz="1200" dirty="0" smtClean="0"/>
-                        <a:t>+ Merchants</a:t>
-                      </a:r>
+                      <a:pPr algn="r"/>
+                      <a:r>
+                        <a:rPr lang="en-US" sz="1000" dirty="0" smtClean="0"/>
+                        <a:t>Each Mobile</a:t>
+                      </a:r>
+                      <a:r>
+                        <a:rPr lang="en-US" sz="1000" baseline="0" dirty="0" smtClean="0"/>
+                        <a:t> Operator</a:t>
+                      </a:r>
+                      <a:endParaRPr lang="en-US" sz="1000" dirty="0" smtClean="0"/>
                     </a:p>
                   </a:txBody>
                   <a:tcPr/>
@@ -4275,9 +4276,25 @@
                     <a:bodyPr/>
                     <a:lstStyle/>
                     <a:p>
+                      <a:pPr algn="l"/>
+                      <a:r>
+                        <a:rPr lang="en-US" sz="1000" dirty="0" smtClean="0"/>
+                        <a:t>+ Merchants</a:t>
+                      </a:r>
+                    </a:p>
+                  </a:txBody>
+                  <a:tcPr/>
+                </a:tc>
+              </a:tr>
+              <a:tr h="370840">
+                <a:tc>
+                  <a:txBody>
+                    <a:bodyPr/>
+                    <a:lstStyle/>
+                    <a:p>
                       <a:pPr algn="r"/>
                       <a:r>
-                        <a:rPr lang="en-US" sz="1200" dirty="0" smtClean="0"/>
+                        <a:rPr lang="en-US" sz="1000" dirty="0" smtClean="0"/>
                         <a:t>Each Merchant</a:t>
                       </a:r>
                     </a:p>
@@ -4298,14 +4315,14 @@
           <p:nvPr>
             <p:extLst>
               <p:ext uri="{D42A27DB-BD31-4B8C-83A1-F6EECF244321}">
-                <p14:modId xmlns:p14="http://schemas.microsoft.com/office/powerpoint/2010/main" val="1488261473"/>
+                <p14:modId xmlns:p14="http://schemas.microsoft.com/office/powerpoint/2010/main" val="2185956858"/>
               </p:ext>
             </p:extLst>
           </p:nvPr>
         </p:nvGraphicFramePr>
         <p:xfrm>
           <a:off x="1751586" y="862032"/>
-          <a:ext cx="7056783" cy="2630170"/>
+          <a:ext cx="7056777" cy="2613025"/>
         </p:xfrm>
         <a:graphic>
           <a:graphicData uri="http://schemas.openxmlformats.org/drawingml/2006/table">
@@ -4314,15 +4331,17 @@
                 <a:tableStyleId>{5C22544A-7EE6-4342-B048-85BDC9FD1C3A}</a:tableStyleId>
               </a:tblPr>
               <a:tblGrid>
-                <a:gridCol w="784087"/>
-                <a:gridCol w="784087"/>
-                <a:gridCol w="784087"/>
-                <a:gridCol w="784087"/>
-                <a:gridCol w="784087"/>
-                <a:gridCol w="784087"/>
-                <a:gridCol w="552060"/>
-                <a:gridCol w="792088"/>
-                <a:gridCol w="1008113"/>
+                <a:gridCol w="641525"/>
+                <a:gridCol w="641525"/>
+                <a:gridCol w="641525"/>
+                <a:gridCol w="641525"/>
+                <a:gridCol w="641525"/>
+                <a:gridCol w="641525"/>
+                <a:gridCol w="641525"/>
+                <a:gridCol w="641525"/>
+                <a:gridCol w="451685"/>
+                <a:gridCol w="648072"/>
+                <a:gridCol w="824820"/>
               </a:tblGrid>
               <a:tr h="370840">
                 <a:tc>
@@ -4332,15 +4351,22 @@
                     <a:p>
                       <a:pPr algn="ctr" fontAlgn="b"/>
                       <a:r>
-                        <a:rPr lang="en-US" sz="1100" b="1" i="0" u="none" strike="noStrike" dirty="0">
+                        <a:rPr lang="en-US" sz="800" b="1" i="0" u="none" strike="noStrike" dirty="0" smtClean="0">
                           <a:solidFill>
                             <a:srgbClr val="FFFFFF"/>
                           </a:solidFill>
                           <a:effectLst/>
                           <a:latin typeface="Arial" panose="020B0604020202020204" pitchFamily="34" charset="0"/>
                         </a:rPr>
-                        <a:t>Date</a:t>
-                      </a:r>
+                        <a:t>Date/Time</a:t>
+                      </a:r>
+                      <a:endParaRPr lang="en-US" sz="800" b="1" i="0" u="none" strike="noStrike" dirty="0">
+                        <a:solidFill>
+                          <a:srgbClr val="FFFFFF"/>
+                        </a:solidFill>
+                        <a:effectLst/>
+                        <a:latin typeface="Arial" panose="020B0604020202020204" pitchFamily="34" charset="0"/>
+                      </a:endParaRPr>
                     </a:p>
                   </a:txBody>
                   <a:tcPr marL="9525" marR="9525" marT="9525" marB="0" anchor="b"/>
@@ -4352,7 +4378,7 @@
                     <a:p>
                       <a:pPr algn="ctr" fontAlgn="b"/>
                       <a:r>
-                        <a:rPr lang="en-US" sz="1100" b="1" i="0" u="none" strike="noStrike">
+                        <a:rPr lang="en-US" sz="800" b="1" i="0" u="none" strike="noStrike" dirty="0">
                           <a:solidFill>
                             <a:srgbClr val="FFFFFF"/>
                           </a:solidFill>
@@ -4372,15 +4398,22 @@
                     <a:p>
                       <a:pPr algn="ctr" fontAlgn="b"/>
                       <a:r>
-                        <a:rPr lang="en-US" sz="1100" b="1" i="0" u="none" strike="noStrike">
+                        <a:rPr lang="en-US" sz="800" b="1" i="0" u="none" strike="noStrike" dirty="0" smtClean="0">
                           <a:solidFill>
                             <a:srgbClr val="FFFFFF"/>
                           </a:solidFill>
                           <a:effectLst/>
                           <a:latin typeface="Arial" panose="020B0604020202020204" pitchFamily="34" charset="0"/>
                         </a:rPr>
-                        <a:t>Bank Deposit Slip Number</a:t>
-                      </a:r>
+                        <a:t>Matching ID</a:t>
+                      </a:r>
+                      <a:endParaRPr lang="en-US" sz="800" b="1" i="0" u="none" strike="noStrike" dirty="0">
+                        <a:solidFill>
+                          <a:srgbClr val="FFFFFF"/>
+                        </a:solidFill>
+                        <a:effectLst/>
+                        <a:latin typeface="Arial" panose="020B0604020202020204" pitchFamily="34" charset="0"/>
+                      </a:endParaRPr>
                     </a:p>
                   </a:txBody>
                   <a:tcPr marL="9525" marR="9525" marT="9525" marB="0" anchor="b"/>
@@ -4392,7 +4425,44 @@
                     <a:p>
                       <a:pPr algn="ctr" fontAlgn="b"/>
                       <a:r>
-                        <a:rPr lang="en-US" sz="1100" b="1" i="0" u="none" strike="noStrike">
+                        <a:rPr lang="en-US" sz="800" b="1" i="0" u="none" strike="noStrike" dirty="0" smtClean="0">
+                          <a:solidFill>
+                            <a:srgbClr val="FFFFFF"/>
+                          </a:solidFill>
+                          <a:effectLst/>
+                          <a:latin typeface="Arial" panose="020B0604020202020204" pitchFamily="34" charset="0"/>
+                        </a:rPr>
+                        <a:t>Paga </a:t>
+                      </a:r>
+                      <a:r>
+                        <a:rPr lang="en-US" sz="800" b="1" i="0" u="none" strike="noStrike" dirty="0" err="1" smtClean="0">
+                          <a:solidFill>
+                            <a:srgbClr val="FFFFFF"/>
+                          </a:solidFill>
+                          <a:effectLst/>
+                          <a:latin typeface="Arial" panose="020B0604020202020204" pitchFamily="34" charset="0"/>
+                        </a:rPr>
+                        <a:t>AccountID</a:t>
+                      </a:r>
+                      <a:endParaRPr lang="en-US" sz="800" b="1" i="0" u="none" strike="noStrike" dirty="0">
+                        <a:solidFill>
+                          <a:srgbClr val="FFFFFF"/>
+                        </a:solidFill>
+                        <a:effectLst/>
+                        <a:latin typeface="Arial" panose="020B0604020202020204" pitchFamily="34" charset="0"/>
+                      </a:endParaRPr>
+                    </a:p>
+                  </a:txBody>
+                  <a:tcPr marL="9525" marR="9525" marT="9525" marB="0" anchor="b"/>
+                </a:tc>
+                <a:tc>
+                  <a:txBody>
+                    <a:bodyPr/>
+                    <a:lstStyle/>
+                    <a:p>
+                      <a:pPr algn="ctr" fontAlgn="b"/>
+                      <a:r>
+                        <a:rPr lang="en-US" sz="800" b="1" i="0" u="none" strike="noStrike" dirty="0">
                           <a:solidFill>
                             <a:srgbClr val="FFFFFF"/>
                           </a:solidFill>
@@ -4412,7 +4482,44 @@
                     <a:p>
                       <a:pPr algn="ctr" fontAlgn="b"/>
                       <a:r>
-                        <a:rPr lang="en-US" sz="1100" b="1" i="0" u="none" strike="noStrike">
+                        <a:rPr lang="en-US" sz="800" b="1" i="0" u="none" strike="noStrike" smtClean="0">
+                          <a:solidFill>
+                            <a:srgbClr val="FFFFFF"/>
+                          </a:solidFill>
+                          <a:effectLst/>
+                          <a:latin typeface="Arial" panose="020B0604020202020204" pitchFamily="34" charset="0"/>
+                        </a:rPr>
+                        <a:t>Financial Transaction </a:t>
+                      </a:r>
+                      <a:r>
+                        <a:rPr lang="en-US" sz="800" b="1" i="0" u="none" strike="noStrike" dirty="0" smtClean="0">
+                          <a:solidFill>
+                            <a:srgbClr val="FFFFFF"/>
+                          </a:solidFill>
+                          <a:effectLst/>
+                          <a:latin typeface="Arial" panose="020B0604020202020204" pitchFamily="34" charset="0"/>
+                        </a:rPr>
+                        <a:t>ID</a:t>
+                      </a:r>
+                      <a:endParaRPr lang="en-US" sz="800" b="1" i="0" u="none" strike="noStrike" dirty="0">
+                        <a:solidFill>
+                          <a:srgbClr val="FFFFFF"/>
+                        </a:solidFill>
+                        <a:effectLst/>
+                        <a:latin typeface="Arial" panose="020B0604020202020204" pitchFamily="34" charset="0"/>
+                      </a:endParaRPr>
+                    </a:p>
+                  </a:txBody>
+                  <a:tcPr marL="9525" marR="9525" marT="9525" marB="0" anchor="b"/>
+                </a:tc>
+                <a:tc>
+                  <a:txBody>
+                    <a:bodyPr/>
+                    <a:lstStyle/>
+                    <a:p>
+                      <a:pPr algn="ctr" fontAlgn="b"/>
+                      <a:r>
+                        <a:rPr lang="en-US" sz="800" b="1" i="0" u="none" strike="noStrike" dirty="0">
                           <a:solidFill>
                             <a:srgbClr val="FFFFFF"/>
                           </a:solidFill>
@@ -4432,7 +4539,7 @@
                     <a:p>
                       <a:pPr algn="ctr" fontAlgn="b"/>
                       <a:r>
-                        <a:rPr lang="en-US" sz="1100" b="1" i="0" u="none" strike="noStrike" dirty="0" smtClean="0">
+                        <a:rPr lang="en-US" sz="800" b="1" i="0" u="none" strike="noStrike" dirty="0" smtClean="0">
                           <a:solidFill>
                             <a:srgbClr val="FFFFFF"/>
                           </a:solidFill>
@@ -4441,7 +4548,7 @@
                         </a:rPr>
                         <a:t>Credits</a:t>
                       </a:r>
-                      <a:endParaRPr lang="en-US" sz="1100" b="1" i="0" u="none" strike="noStrike" dirty="0">
+                      <a:endParaRPr lang="en-US" sz="800" b="1" i="0" u="none" strike="noStrike" dirty="0">
                         <a:solidFill>
                           <a:srgbClr val="FFFFFF"/>
                         </a:solidFill>
@@ -4459,7 +4566,7 @@
                     <a:p>
                       <a:pPr algn="ctr" fontAlgn="b"/>
                       <a:r>
-                        <a:rPr lang="en-US" sz="1100" b="1" i="0" u="none" strike="noStrike" dirty="0" smtClean="0">
+                        <a:rPr lang="en-US" sz="800" b="1" i="0" u="none" strike="noStrike" dirty="0" smtClean="0">
                           <a:solidFill>
                             <a:srgbClr val="FFFFFF"/>
                           </a:solidFill>
@@ -4479,7 +4586,7 @@
                     <a:p>
                       <a:pPr algn="ctr" fontAlgn="b"/>
                       <a:r>
-                        <a:rPr lang="en-US" sz="1100" b="1" i="0" u="none" strike="noStrike" dirty="0" smtClean="0">
+                        <a:rPr lang="en-US" sz="800" b="1" i="0" u="none" strike="noStrike" dirty="0" smtClean="0">
                           <a:solidFill>
                             <a:srgbClr val="FFFFFF"/>
                           </a:solidFill>
@@ -4488,7 +4595,7 @@
                         </a:rPr>
                         <a:t>Debits</a:t>
                       </a:r>
-                      <a:endParaRPr lang="en-US" sz="1100" b="1" i="0" u="none" strike="noStrike" dirty="0">
+                      <a:endParaRPr lang="en-US" sz="800" b="1" i="0" u="none" strike="noStrike" dirty="0">
                         <a:solidFill>
                           <a:srgbClr val="FFFFFF"/>
                         </a:solidFill>
@@ -4506,7 +4613,7 @@
                     <a:p>
                       <a:pPr algn="ctr" fontAlgn="b"/>
                       <a:r>
-                        <a:rPr lang="en-US" sz="1100" b="1" i="0" u="none" strike="noStrike" dirty="0">
+                        <a:rPr lang="en-US" sz="800" b="1" i="0" u="none" strike="noStrike" dirty="0">
                           <a:solidFill>
                             <a:srgbClr val="FFFFFF"/>
                           </a:solidFill>
@@ -4593,6 +4700,25 @@
                     <a:lstStyle/>
                     <a:p>
                       <a:pPr algn="l" fontAlgn="b"/>
+                      <a:endParaRPr lang="en-US" sz="1000" b="0" i="0" u="none" strike="noStrike">
+                        <a:solidFill>
+                          <a:schemeClr val="bg1">
+                            <a:lumMod val="65000"/>
+                          </a:schemeClr>
+                        </a:solidFill>
+                        <a:effectLst/>
+                        <a:latin typeface="+mj-lt"/>
+                      </a:endParaRPr>
+                    </a:p>
+                  </a:txBody>
+                  <a:tcPr marL="9525" marR="9525" marT="9525" marB="0" anchor="b"/>
+                </a:tc>
+                <a:tc>
+                  <a:txBody>
+                    <a:bodyPr/>
+                    <a:lstStyle/>
+                    <a:p>
+                      <a:pPr algn="l" fontAlgn="b"/>
                       <a:r>
                         <a:rPr lang="en-US" sz="1000" b="0" i="0" u="none" strike="noStrike">
                           <a:solidFill>
@@ -4615,6 +4741,25 @@
                     <a:lstStyle/>
                     <a:p>
                       <a:pPr algn="l" fontAlgn="b"/>
+                      <a:endParaRPr lang="en-US" sz="1000" b="0" i="0" u="none" strike="noStrike">
+                        <a:solidFill>
+                          <a:schemeClr val="bg1">
+                            <a:lumMod val="65000"/>
+                          </a:schemeClr>
+                        </a:solidFill>
+                        <a:effectLst/>
+                        <a:latin typeface="+mj-lt"/>
+                      </a:endParaRPr>
+                    </a:p>
+                  </a:txBody>
+                  <a:tcPr marL="9525" marR="9525" marT="9525" marB="0" anchor="b"/>
+                </a:tc>
+                <a:tc>
+                  <a:txBody>
+                    <a:bodyPr/>
+                    <a:lstStyle/>
+                    <a:p>
+                      <a:pPr algn="l" fontAlgn="b"/>
                       <a:r>
                         <a:rPr lang="en-US" sz="1000" b="0" i="0" u="none" strike="noStrike">
                           <a:solidFill>
@@ -4711,7 +4856,7 @@
                     <a:p>
                       <a:pPr algn="r" fontAlgn="b"/>
                       <a:r>
-                        <a:rPr lang="en-US" sz="1000" b="0" i="0" u="none" strike="noStrike">
+                        <a:rPr lang="en-US" sz="1000" b="0" i="0" u="none" strike="noStrike" dirty="0">
                           <a:solidFill>
                             <a:schemeClr val="bg1">
                               <a:lumMod val="65000"/>
@@ -4800,6 +4945,25 @@
                     <a:lstStyle/>
                     <a:p>
                       <a:pPr algn="l" fontAlgn="b"/>
+                      <a:endParaRPr lang="en-US" sz="1000" b="0" i="0" u="none" strike="noStrike" dirty="0">
+                        <a:solidFill>
+                          <a:schemeClr val="bg1">
+                            <a:lumMod val="65000"/>
+                          </a:schemeClr>
+                        </a:solidFill>
+                        <a:effectLst/>
+                        <a:latin typeface="+mj-lt"/>
+                      </a:endParaRPr>
+                    </a:p>
+                  </a:txBody>
+                  <a:tcPr marL="9525" marR="9525" marT="9525" marB="0" anchor="b"/>
+                </a:tc>
+                <a:tc>
+                  <a:txBody>
+                    <a:bodyPr/>
+                    <a:lstStyle/>
+                    <a:p>
+                      <a:pPr algn="l" fontAlgn="b"/>
                       <a:r>
                         <a:rPr lang="en-US" sz="1000" b="0" i="0" u="none" strike="noStrike" dirty="0">
                           <a:solidFill>
@@ -4822,6 +4986,25 @@
                     <a:lstStyle/>
                     <a:p>
                       <a:pPr algn="l" fontAlgn="b"/>
+                      <a:endParaRPr lang="en-US" sz="1000" b="0" i="0" u="none" strike="noStrike" dirty="0">
+                        <a:solidFill>
+                          <a:schemeClr val="bg1">
+                            <a:lumMod val="65000"/>
+                          </a:schemeClr>
+                        </a:solidFill>
+                        <a:effectLst/>
+                        <a:latin typeface="+mj-lt"/>
+                      </a:endParaRPr>
+                    </a:p>
+                  </a:txBody>
+                  <a:tcPr marL="9525" marR="9525" marT="9525" marB="0" anchor="b"/>
+                </a:tc>
+                <a:tc>
+                  <a:txBody>
+                    <a:bodyPr/>
+                    <a:lstStyle/>
+                    <a:p>
+                      <a:pPr algn="l" fontAlgn="b"/>
                       <a:r>
                         <a:rPr lang="en-US" sz="1000" b="0" i="0" u="none" strike="noStrike" dirty="0">
                           <a:solidFill>
@@ -5001,6 +5184,23 @@
                     <a:lstStyle/>
                     <a:p>
                       <a:pPr algn="l" fontAlgn="b"/>
+                      <a:endParaRPr lang="en-US" sz="1000" b="0" i="0" u="none" strike="noStrike" dirty="0">
+                        <a:solidFill>
+                          <a:srgbClr val="000000"/>
+                        </a:solidFill>
+                        <a:effectLst/>
+                        <a:latin typeface="+mj-lt"/>
+                      </a:endParaRPr>
+                    </a:p>
+                  </a:txBody>
+                  <a:tcPr marL="9525" marR="9525" marT="9525" marB="0" anchor="b"/>
+                </a:tc>
+                <a:tc>
+                  <a:txBody>
+                    <a:bodyPr/>
+                    <a:lstStyle/>
+                    <a:p>
+                      <a:pPr algn="l" fontAlgn="b"/>
                       <a:r>
                         <a:rPr lang="en-US" sz="1000" b="0" i="0" u="none" strike="noStrike" dirty="0" err="1">
                           <a:solidFill>
@@ -5031,6 +5231,23 @@
                     <a:lstStyle/>
                     <a:p>
                       <a:pPr algn="l" fontAlgn="b"/>
+                      <a:endParaRPr lang="en-US" sz="1000" b="0" i="0" u="none" strike="noStrike" dirty="0">
+                        <a:solidFill>
+                          <a:srgbClr val="000000"/>
+                        </a:solidFill>
+                        <a:effectLst/>
+                        <a:latin typeface="+mj-lt"/>
+                      </a:endParaRPr>
+                    </a:p>
+                  </a:txBody>
+                  <a:tcPr marL="9525" marR="9525" marT="9525" marB="0" anchor="b"/>
+                </a:tc>
+                <a:tc>
+                  <a:txBody>
+                    <a:bodyPr/>
+                    <a:lstStyle/>
+                    <a:p>
+                      <a:pPr algn="l" fontAlgn="b"/>
                       <a:r>
                         <a:rPr lang="en-US" sz="1000" b="0" i="0" u="none" strike="noStrike" dirty="0">
                           <a:solidFill>
@@ -5192,6 +5409,23 @@
                     <a:lstStyle/>
                     <a:p>
                       <a:pPr algn="l" fontAlgn="b"/>
+                      <a:endParaRPr lang="en-US" sz="1000" b="0" i="0" u="none" strike="noStrike">
+                        <a:solidFill>
+                          <a:srgbClr val="000000"/>
+                        </a:solidFill>
+                        <a:effectLst/>
+                        <a:latin typeface="+mj-lt"/>
+                      </a:endParaRPr>
+                    </a:p>
+                  </a:txBody>
+                  <a:tcPr marL="9525" marR="9525" marT="9525" marB="0" anchor="b"/>
+                </a:tc>
+                <a:tc>
+                  <a:txBody>
+                    <a:bodyPr/>
+                    <a:lstStyle/>
+                    <a:p>
+                      <a:pPr algn="l" fontAlgn="b"/>
                       <a:r>
                         <a:rPr lang="en-US" sz="1000" b="0" i="0" u="none" strike="noStrike">
                           <a:solidFill>
@@ -5212,6 +5446,23 @@
                     <a:lstStyle/>
                     <a:p>
                       <a:pPr algn="l" fontAlgn="b"/>
+                      <a:endParaRPr lang="en-US" sz="1000" b="0" i="0" u="none" strike="noStrike">
+                        <a:solidFill>
+                          <a:srgbClr val="000000"/>
+                        </a:solidFill>
+                        <a:effectLst/>
+                        <a:latin typeface="+mj-lt"/>
+                      </a:endParaRPr>
+                    </a:p>
+                  </a:txBody>
+                  <a:tcPr marL="9525" marR="9525" marT="9525" marB="0" anchor="b"/>
+                </a:tc>
+                <a:tc>
+                  <a:txBody>
+                    <a:bodyPr/>
+                    <a:lstStyle/>
+                    <a:p>
+                      <a:pPr algn="l" fontAlgn="b"/>
                       <a:r>
                         <a:rPr lang="en-US" sz="1000" b="0" i="0" u="none" strike="noStrike">
                           <a:solidFill>
@@ -5367,6 +5618,23 @@
                     <a:lstStyle/>
                     <a:p>
                       <a:pPr algn="l" fontAlgn="b"/>
+                      <a:endParaRPr lang="en-US" sz="1000" b="0" i="0" u="none" strike="noStrike" dirty="0">
+                        <a:solidFill>
+                          <a:srgbClr val="000000"/>
+                        </a:solidFill>
+                        <a:effectLst/>
+                        <a:latin typeface="+mj-lt"/>
+                      </a:endParaRPr>
+                    </a:p>
+                  </a:txBody>
+                  <a:tcPr marL="9525" marR="9525" marT="9525" marB="0" anchor="b"/>
+                </a:tc>
+                <a:tc>
+                  <a:txBody>
+                    <a:bodyPr/>
+                    <a:lstStyle/>
+                    <a:p>
+                      <a:pPr algn="l" fontAlgn="b"/>
                       <a:r>
                         <a:rPr lang="en-US" sz="1000" b="0" i="0" u="none" strike="noStrike">
                           <a:solidFill>
@@ -5377,6 +5645,23 @@
                         </a:rPr>
                         <a:t>ING Systems (4)</a:t>
                       </a:r>
+                    </a:p>
+                  </a:txBody>
+                  <a:tcPr marL="9525" marR="9525" marT="9525" marB="0" anchor="b"/>
+                </a:tc>
+                <a:tc>
+                  <a:txBody>
+                    <a:bodyPr/>
+                    <a:lstStyle/>
+                    <a:p>
+                      <a:pPr algn="l" fontAlgn="b"/>
+                      <a:endParaRPr lang="en-US" sz="1000" b="0" i="0" u="none" strike="noStrike" dirty="0">
+                        <a:solidFill>
+                          <a:srgbClr val="000000"/>
+                        </a:solidFill>
+                        <a:effectLst/>
+                        <a:latin typeface="+mj-lt"/>
+                      </a:endParaRPr>
                     </a:p>
                   </a:txBody>
                   <a:tcPr marL="9525" marR="9525" marT="9525" marB="0" anchor="b"/>
@@ -5868,7 +6153,7 @@
         <p:spPr>
           <a:xfrm>
             <a:off x="9122946" y="567597"/>
-            <a:ext cx="1014717" cy="695866"/>
+            <a:ext cx="1014717" cy="989196"/>
           </a:xfrm>
           <a:prstGeom prst="borderCallout1">
             <a:avLst>
@@ -5901,14 +6186,53 @@
           <a:p>
             <a:pPr algn="ctr"/>
             <a:r>
-              <a:rPr lang="en-US" sz="1200" dirty="0" smtClean="0"/>
+              <a:rPr lang="en-US" sz="800" dirty="0" smtClean="0"/>
               <a:t>Find specific </a:t>
             </a:r>
             <a:r>
-              <a:rPr lang="en-US" sz="1200" dirty="0" err="1" smtClean="0"/>
+              <a:rPr lang="en-US" sz="800" dirty="0" err="1" smtClean="0"/>
               <a:t>tx</a:t>
             </a:r>
-            <a:endParaRPr lang="en-US" sz="1200" dirty="0"/>
+            <a:r>
+              <a:rPr lang="en-US" sz="800" dirty="0"/>
+              <a:t> </a:t>
+            </a:r>
+            <a:r>
+              <a:rPr lang="en-US" sz="800" dirty="0" smtClean="0"/>
+              <a:t>by account name, </a:t>
+            </a:r>
+            <a:r>
+              <a:rPr lang="en-US" sz="800" dirty="0" err="1" smtClean="0"/>
+              <a:t>paga</a:t>
+            </a:r>
+            <a:r>
+              <a:rPr lang="en-US" sz="800" dirty="0" smtClean="0"/>
+              <a:t> account ID,</a:t>
+            </a:r>
+          </a:p>
+          <a:p>
+            <a:pPr algn="ctr"/>
+            <a:r>
+              <a:rPr lang="en-US" sz="800" dirty="0" smtClean="0"/>
+              <a:t>Ref no., </a:t>
+            </a:r>
+            <a:r>
+              <a:rPr lang="en-US" sz="800" dirty="0" err="1" smtClean="0"/>
+              <a:t>tx</a:t>
+            </a:r>
+            <a:r>
+              <a:rPr lang="en-US" sz="800" dirty="0" smtClean="0"/>
+              <a:t> </a:t>
+            </a:r>
+            <a:r>
+              <a:rPr lang="en-US" sz="800" dirty="0" err="1" smtClean="0"/>
+              <a:t>num</a:t>
+            </a:r>
+            <a:r>
+              <a:rPr lang="en-US" sz="800" dirty="0" smtClean="0"/>
+              <a:t>, etc.</a:t>
+            </a:r>
+            <a:endParaRPr lang="en-US" sz="800" dirty="0"/>
           </a:p>
         </p:txBody>
       </p:sp>
@@ -10754,15 +11078,7 @@
             <a:pPr algn="ctr"/>
             <a:r>
               <a:rPr lang="en-US" sz="1200" dirty="0" smtClean="0"/>
-              <a:t>If there are flagged transactions, open the process flagged transactions </a:t>
-            </a:r>
-            <a:r>
-              <a:rPr lang="en-US" sz="1200" dirty="0" smtClean="0"/>
-              <a:t>screen for the correct recon type, </a:t>
-            </a:r>
-            <a:r>
-              <a:rPr lang="en-US" sz="1200" dirty="0" smtClean="0"/>
-              <a:t>otherwise go straight to Finalize Recon </a:t>
+              <a:t>If there are flagged transactions, open the process flagged transactions screen for the correct recon type, otherwise go straight to Finalize Recon </a:t>
             </a:r>
             <a:endParaRPr lang="en-US" sz="1200" dirty="0"/>
           </a:p>
@@ -11996,13 +12312,8 @@
           <a:p>
             <a:r>
               <a:rPr lang="en-US" dirty="0" smtClean="0"/>
-              <a:t>Process Flagged </a:t>
+              <a:t>Process Flagged Transactions: Cash Pool Recon</a:t>
             </a:r>
-            <a:r>
-              <a:rPr lang="en-US" dirty="0" smtClean="0"/>
-              <a:t>Transactions: Cash Pool Recon</a:t>
-            </a:r>
-            <a:endParaRPr lang="en-US" dirty="0" smtClean="0"/>
           </a:p>
           <a:p>
             <a:r>
@@ -12483,7 +12794,6 @@
               <a:rPr lang="en-US" sz="1000" dirty="0" smtClean="0"/>
               <a:t>.</a:t>
             </a:r>
-            <a:endParaRPr lang="en-US" sz="1000" dirty="0" smtClean="0"/>
           </a:p>
           <a:p>
             <a:endParaRPr lang="en-US" sz="1000" dirty="0" smtClean="0"/>
@@ -12956,11 +13266,6 @@
                   </a:rPr>
                   <a:t>Show Statement Transactions</a:t>
                 </a:r>
-                <a:endParaRPr lang="en-US" sz="1200" dirty="0" smtClean="0">
-                  <a:latin typeface="Segoe UI" pitchFamily="34" charset="0"/>
-                  <a:ea typeface="Segoe UI" pitchFamily="34" charset="0"/>
-                  <a:cs typeface="Segoe UI" pitchFamily="34" charset="0"/>
-                </a:endParaRPr>
               </a:p>
             </p:txBody>
           </p:sp>
@@ -13116,11 +13421,6 @@
                 </a:rPr>
                 <a:t>Show General Ledger Transactions</a:t>
               </a:r>
-              <a:endParaRPr lang="en-US" sz="1200" dirty="0" smtClean="0">
-                <a:latin typeface="Segoe UI" pitchFamily="34" charset="0"/>
-                <a:ea typeface="Segoe UI" pitchFamily="34" charset="0"/>
-                <a:cs typeface="Segoe UI" pitchFamily="34" charset="0"/>
-              </a:endParaRPr>
             </a:p>
           </p:txBody>
         </p:sp>
@@ -13821,11 +14121,7 @@
           <a:p>
             <a:r>
               <a:rPr lang="en-US" sz="1100" dirty="0"/>
-              <a:t>3095298/SENSAT DIGITAL SYSTEM/0420VN</a:t>
-            </a:r>
-            <a:r>
-              <a:rPr lang="en-US" sz="1100" dirty="0"/>
-              <a:t> </a:t>
+              <a:t>3095298/SENSAT DIGITAL SYSTEM/0420VN </a:t>
             </a:r>
             <a:endParaRPr lang="en-US" sz="1100" dirty="0">
               <a:solidFill>
@@ -15225,13 +15521,8 @@
           <a:p>
             <a:r>
               <a:rPr lang="en-US" dirty="0" smtClean="0"/>
-              <a:t>Process Flagged </a:t>
+              <a:t>Process Flagged Transactions: Card Recon</a:t>
             </a:r>
-            <a:r>
-              <a:rPr lang="en-US" dirty="0" smtClean="0"/>
-              <a:t>Transactions: Card Recon</a:t>
-            </a:r>
-            <a:endParaRPr lang="en-US" dirty="0" smtClean="0"/>
           </a:p>
           <a:p>
             <a:r>
@@ -15414,11 +15705,7 @@
                     <a:p>
                       <a:r>
                         <a:rPr lang="en-US" sz="1200" dirty="0" smtClean="0"/>
-                        <a:t>User Name or Card </a:t>
-                      </a:r>
-                      <a:r>
-                        <a:rPr lang="en-US" sz="1200" dirty="0" smtClean="0"/>
-                        <a:t>Number</a:t>
+                        <a:t>User Name or Card Number</a:t>
                       </a:r>
                       <a:endParaRPr lang="en-US" sz="1200" dirty="0"/>
                     </a:p>
@@ -15840,11 +16127,6 @@
                   </a:rPr>
                   <a:t>Show Statement Transactions</a:t>
                 </a:r>
-                <a:endParaRPr lang="en-US" sz="1200" dirty="0" smtClean="0">
-                  <a:latin typeface="Segoe UI" pitchFamily="34" charset="0"/>
-                  <a:ea typeface="Segoe UI" pitchFamily="34" charset="0"/>
-                  <a:cs typeface="Segoe UI" pitchFamily="34" charset="0"/>
-                </a:endParaRPr>
               </a:p>
             </p:txBody>
           </p:sp>
@@ -16000,11 +16282,6 @@
                 </a:rPr>
                 <a:t>Show General Ledger Transactions</a:t>
               </a:r>
-              <a:endParaRPr lang="en-US" sz="1200" dirty="0" smtClean="0">
-                <a:latin typeface="Segoe UI" pitchFamily="34" charset="0"/>
-                <a:ea typeface="Segoe UI" pitchFamily="34" charset="0"/>
-                <a:cs typeface="Segoe UI" pitchFamily="34" charset="0"/>
-              </a:endParaRPr>
             </a:p>
           </p:txBody>
         </p:sp>
@@ -16578,11 +16855,7 @@
           <a:p>
             <a:r>
               <a:rPr lang="en-US" sz="1100" dirty="0"/>
-              <a:t>3095298/SENSAT DIGITAL SYSTEM/0420VN</a:t>
-            </a:r>
-            <a:r>
-              <a:rPr lang="en-US" sz="1100" dirty="0"/>
-              <a:t> </a:t>
+              <a:t>3095298/SENSAT DIGITAL SYSTEM/0420VN </a:t>
             </a:r>
             <a:endParaRPr lang="en-US" sz="1100" dirty="0">
               <a:solidFill>
@@ -17842,13 +18115,8 @@
           <a:p>
             <a:r>
               <a:rPr lang="en-US" dirty="0" smtClean="0"/>
-              <a:t>Finalize Reconciliation – </a:t>
+              <a:t>Finalize Reconciliation – Card Recon</a:t>
             </a:r>
-            <a:r>
-              <a:rPr lang="en-US" dirty="0" smtClean="0"/>
-              <a:t>Card Recon</a:t>
-            </a:r>
-            <a:endParaRPr lang="en-US" dirty="0" smtClean="0"/>
           </a:p>
         </p:txBody>
       </p:sp>
@@ -18552,14 +18820,12 @@
               <a:rPr lang="en-US" sz="1000" dirty="0" smtClean="0"/>
               <a:t>To be refunded items never made to the GL.</a:t>
             </a:r>
-            <a:endParaRPr lang="en-US" sz="1000" dirty="0" smtClean="0"/>
           </a:p>
           <a:p>
             <a:r>
               <a:rPr lang="en-US" sz="1000" dirty="0" smtClean="0"/>
               <a:t> </a:t>
             </a:r>
-            <a:endParaRPr lang="en-US" sz="1000" dirty="0" smtClean="0"/>
           </a:p>
         </p:txBody>
       </p:sp>
@@ -18860,11 +19126,7 @@
                     <a:p>
                       <a:r>
                         <a:rPr lang="en-US" sz="1200" dirty="0" smtClean="0"/>
-                        <a:t>Cleared </a:t>
-                      </a:r>
-                      <a:r>
-                        <a:rPr lang="en-US" sz="1200" dirty="0" smtClean="0"/>
-                        <a:t>Amount</a:t>
+                        <a:t>Cleared Amount</a:t>
                       </a:r>
                       <a:endParaRPr lang="en-US" sz="1200" dirty="0"/>
                     </a:p>
@@ -19029,7 +19291,6 @@
                         <a:rPr lang="en-US" sz="1100" dirty="0" smtClean="0"/>
                         <a:t>Amount Mismatch</a:t>
                       </a:r>
-                      <a:endParaRPr lang="en-US" sz="1100" dirty="0" smtClean="0"/>
                     </a:p>
                   </a:txBody>
                   <a:tcPr/>
@@ -19760,13 +20021,8 @@
           <a:p>
             <a:r>
               <a:rPr lang="en-US" dirty="0" smtClean="0"/>
-              <a:t>Finalize Reconciliation </a:t>
+              <a:t>Finalize Reconciliation – Cash Pool</a:t>
             </a:r>
-            <a:r>
-              <a:rPr lang="en-US" dirty="0" smtClean="0"/>
-              <a:t>– Cash Pool</a:t>
-            </a:r>
-            <a:endParaRPr lang="en-US" dirty="0" smtClean="0"/>
           </a:p>
         </p:txBody>
       </p:sp>
@@ -22916,31 +23172,31 @@
 
 <file path=customXml/item1.xml><?xml version="1.0" encoding="utf-8"?>
 <Control xmlns="http://schemas.microsoft.com/VisualStudio/2011/storyboarding/control">
-  <Id Name="System.Storyboarding.Common.DatePicker" Revision="1" Stencil="System.Storyboarding.Common" StencilVersion="0.1"/>
+  <Id Name="System.Storyboarding.WindowsAppIcons.Filter" Revision="1" Stencil="System.Storyboarding.WindowsAppIcons" StencilVersion="0.1"/>
 </Control>
 </file>
 
 <file path=customXml/item10.xml><?xml version="1.0" encoding="utf-8"?>
 <Control xmlns="http://schemas.microsoft.com/VisualStudio/2011/storyboarding/control">
-  <Id Name="System.Storyboarding.Common.ScrollbarVertical" Revision="1" Stencil="System.Storyboarding.Common" StencilVersion="0.1"/>
+  <Id Name="03ad4d9b-4b9d-44ba-9033-0000952eba9d" RevisionId="77940bd2-b573-4b5a-acef-50d9302aaf3c" Stencil="172d6d98-e5c9-42e9-a209-79f7a94bbd38" StencilRevisionId="00000000-0000-0000-0000-000000000000" StencilVersion="0.0"/>
 </Control>
 </file>
 
 <file path=customXml/item11.xml><?xml version="1.0" encoding="utf-8"?>
 <Control xmlns="http://schemas.microsoft.com/VisualStudio/2011/storyboarding/control">
-  <Id Name="System.Storyboarding.Common.ScrollbarVertical" Revision="1" Stencil="System.Storyboarding.Common" StencilVersion="0.1"/>
+  <Id Name="System.Storyboarding.WindowsApps.WindowsAppsEditBox" Revision="1" Stencil="System.Storyboarding.WindowsApps" StencilVersion="0.1"/>
 </Control>
 </file>
 
 <file path=customXml/item12.xml><?xml version="1.0" encoding="utf-8"?>
 <Control xmlns="http://schemas.microsoft.com/VisualStudio/2011/storyboarding/control">
-  <Id Name="System.Storyboarding.Annotation.StickyNote" Revision="1" Stencil="System.Storyboarding.Annotation" StencilVersion="0.1"/>
+  <Id Name="System.Storyboarding.WindowsAppIcons.Search" Revision="1" Stencil="System.Storyboarding.WindowsAppIcons" StencilVersion="0.1"/>
 </Control>
 </file>
 
 <file path=customXml/item13.xml><?xml version="1.0" encoding="utf-8"?>
 <Control xmlns="http://schemas.microsoft.com/VisualStudio/2011/storyboarding/control">
-  <Id Name="System.Storyboarding.Common.CheckBoxChecked" Revision="1" Stencil="System.Storyboarding.Common" StencilVersion="0.1"/>
+  <Id Name="System.Storyboarding.Common.DatePicker" Revision="1" Stencil="System.Storyboarding.Common" StencilVersion="0.1"/>
 </Control>
 </file>
 
@@ -22952,31 +23208,31 @@
 
 <file path=customXml/item15.xml><?xml version="1.0" encoding="utf-8"?>
 <Control xmlns="http://schemas.microsoft.com/VisualStudio/2011/storyboarding/control">
-  <Id Name="System.Storyboarding.Annotation.StickyNote" Revision="1" Stencil="System.Storyboarding.Annotation" StencilVersion="0.1"/>
+  <Id Name="2af01176-85ee-4929-8d41-a331980c979e" RevisionId="be170569-95d9-41cc-85ac-d2bbd0fbf029" Stencil="172d6d98-e5c9-42e9-a209-79f7a94bbd38" StencilRevisionId="00000000-0000-0000-0000-000000000000" StencilVersion="0.0"/>
 </Control>
 </file>
 
 <file path=customXml/item16.xml><?xml version="1.0" encoding="utf-8"?>
 <Control xmlns="http://schemas.microsoft.com/VisualStudio/2011/storyboarding/control">
-  <Id Name="System.Storyboarding.Annotation.AnimatedRectangleCallout" Revision="1" Stencil="System.Storyboarding.Annotation" StencilVersion="0.1"/>
+  <Id Name="System.Storyboarding.WindowsAppIcons.Save" Revision="1" Stencil="System.Storyboarding.WindowsAppIcons" StencilVersion="0.1"/>
 </Control>
 </file>
 
 <file path=customXml/item17.xml><?xml version="1.0" encoding="utf-8"?>
 <Control xmlns="http://schemas.microsoft.com/VisualStudio/2011/storyboarding/control">
-  <Id Name="System.Storyboarding.Annotation.StickyNote" Revision="1" Stencil="System.Storyboarding.Annotation" StencilVersion="0.1"/>
+  <Id Name="System.Storyboarding.Common.CheckBoxUnchecked" Revision="1" Stencil="System.Storyboarding.Common" StencilVersion="0.1"/>
 </Control>
 </file>
 
 <file path=customXml/item18.xml><?xml version="1.0" encoding="utf-8"?>
 <Control xmlns="http://schemas.microsoft.com/VisualStudio/2011/storyboarding/control">
-  <Id Name="System.Storyboarding.WindowsDesktop.Group" Revision="1" Stencil="System.Storyboarding.WindowsDesktop" StencilVersion="0.1"/>
+  <Id Name="System.Storyboarding.WindowsApps.WindowsAppsEditBox" Revision="1" Stencil="System.Storyboarding.WindowsApps" StencilVersion="0.1"/>
 </Control>
 </file>
 
 <file path=customXml/item19.xml><?xml version="1.0" encoding="utf-8"?>
 <Control xmlns="http://schemas.microsoft.com/VisualStudio/2011/storyboarding/control">
-  <Id Name="System.Storyboarding.WindowsApps.WindowsAppsEditBox" Revision="1" Stencil="System.Storyboarding.WindowsApps" StencilVersion="0.1"/>
+  <Id Name="System.Storyboarding.Annotation.AnimatedRectangleCallout" Revision="1" Stencil="System.Storyboarding.Annotation" StencilVersion="0.1"/>
 </Control>
 </file>
 
@@ -22988,25 +23244,25 @@
 
 <file path=customXml/item20.xml><?xml version="1.0" encoding="utf-8"?>
 <Control xmlns="http://schemas.microsoft.com/VisualStudio/2011/storyboarding/control">
-  <Id Name="System.Storyboarding.WindowsApps.WindowsAppsEditBox" Revision="1" Stencil="System.Storyboarding.WindowsApps" StencilVersion="0.1"/>
+  <Id Name="System.Storyboarding.Common.DatePicker" Revision="1" Stencil="System.Storyboarding.Common" StencilVersion="0.1"/>
 </Control>
 </file>
 
 <file path=customXml/item21.xml><?xml version="1.0" encoding="utf-8"?>
 <Control xmlns="http://schemas.microsoft.com/VisualStudio/2011/storyboarding/control">
-  <Id Name="System.Storyboarding.WindowsApps.WindowsAppsEditBox" Revision="1" Stencil="System.Storyboarding.WindowsApps" StencilVersion="0.1"/>
+  <Id Name="03ad4d9b-4b9d-44ba-9033-0000952eba9d" RevisionId="77940bd2-b573-4b5a-acef-50d9302aaf3c" Stencil="172d6d98-e5c9-42e9-a209-79f7a94bbd38" StencilRevisionId="00000000-0000-0000-0000-000000000000" StencilVersion="0.0"/>
 </Control>
 </file>
 
 <file path=customXml/item22.xml><?xml version="1.0" encoding="utf-8"?>
 <Control xmlns="http://schemas.microsoft.com/VisualStudio/2011/storyboarding/control">
-  <Id Name="2af01176-85ee-4929-8d41-a331980c979e" RevisionId="be170569-95d9-41cc-85ac-d2bbd0fbf029" Stencil="172d6d98-e5c9-42e9-a209-79f7a94bbd38" StencilRevisionId="00000000-0000-0000-0000-000000000000" StencilVersion="0.0"/>
+  <Id Name="System.Storyboarding.Annotation.StickyNote" Revision="1" Stencil="System.Storyboarding.Annotation" StencilVersion="0.1"/>
 </Control>
 </file>
 
 <file path=customXml/item23.xml><?xml version="1.0" encoding="utf-8"?>
 <Control xmlns="http://schemas.microsoft.com/VisualStudio/2011/storyboarding/control">
-  <Id Name="System.Storyboarding.WindowsApps.WindowsAppsComboBox" Revision="1" Stencil="System.Storyboarding.WindowsApps" StencilVersion="0.1"/>
+  <Id Name="System.Storyboarding.Annotation.StickyNote" Revision="1" Stencil="System.Storyboarding.Annotation" StencilVersion="0.1"/>
 </Control>
 </file>
 
@@ -23018,43 +23274,43 @@
 
 <file path=customXml/item25.xml><?xml version="1.0" encoding="utf-8"?>
 <Control xmlns="http://schemas.microsoft.com/VisualStudio/2011/storyboarding/control">
-  <Id Name="System.Storyboarding.WindowsApps.WindowsAppsEditBox" Revision="1" Stencil="System.Storyboarding.WindowsApps" StencilVersion="0.1"/>
+  <Id Name="System.Storyboarding.Annotation.StickyNote" Revision="1" Stencil="System.Storyboarding.Annotation" StencilVersion="0.1"/>
 </Control>
 </file>
 
 <file path=customXml/item26.xml><?xml version="1.0" encoding="utf-8"?>
 <Control xmlns="http://schemas.microsoft.com/VisualStudio/2011/storyboarding/control">
-  <Id Name="f7a94b64-51d6-472a-8bb4-f2cc047935d1" RevisionId="4b37df06-a36b-4383-9074-55517f1335fc" Stencil="172d6d98-e5c9-42e9-a209-79f7a94bbd38" StencilRevisionId="00000000-0000-0000-0000-000000000000" StencilVersion="0.0"/>
+  <Id Name="2af01176-85ee-4929-8d41-a331980c979e" RevisionId="be170569-95d9-41cc-85ac-d2bbd0fbf029" Stencil="172d6d98-e5c9-42e9-a209-79f7a94bbd38" StencilRevisionId="00000000-0000-0000-0000-000000000000" StencilVersion="0.0"/>
 </Control>
 </file>
 
 <file path=customXml/item27.xml><?xml version="1.0" encoding="utf-8"?>
 <Control xmlns="http://schemas.microsoft.com/VisualStudio/2011/storyboarding/control">
-  <Id Name="System.Storyboarding.WindowsAppIcons.Save" Revision="1" Stencil="System.Storyboarding.WindowsAppIcons" StencilVersion="0.1"/>
+  <Id Name="System.Storyboarding.WindowsApps.WindowsAppsEditBox" Revision="1" Stencil="System.Storyboarding.WindowsApps" StencilVersion="0.1"/>
 </Control>
 </file>
 
 <file path=customXml/item28.xml><?xml version="1.0" encoding="utf-8"?>
 <Control xmlns="http://schemas.microsoft.com/VisualStudio/2011/storyboarding/control">
-  <Id Name="System.Storyboarding.Annotation.AnimatedRectangleCallout" Revision="1" Stencil="System.Storyboarding.Annotation" StencilVersion="0.1"/>
+  <Id Name="System.Storyboarding.WindowsAppIcons.Save" Revision="1" Stencil="System.Storyboarding.WindowsAppIcons" StencilVersion="0.1"/>
 </Control>
 </file>
 
 <file path=customXml/item29.xml><?xml version="1.0" encoding="utf-8"?>
 <Control xmlns="http://schemas.microsoft.com/VisualStudio/2011/storyboarding/control">
-  <Id Name="System.Storyboarding.Common.CheckBoxChecked" Revision="1" Stencil="System.Storyboarding.Common" StencilVersion="0.1"/>
+  <Id Name="System.Storyboarding.Common.DatePicker" Revision="1" Stencil="System.Storyboarding.Common" StencilVersion="0.1"/>
 </Control>
 </file>
 
 <file path=customXml/item3.xml><?xml version="1.0" encoding="utf-8"?>
 <Control xmlns="http://schemas.microsoft.com/VisualStudio/2011/storyboarding/control">
-  <Id Name="03ad4d9b-4b9d-44ba-9033-0000952eba9d" RevisionId="77940bd2-b573-4b5a-acef-50d9302aaf3c" Stencil="172d6d98-e5c9-42e9-a209-79f7a94bbd38" StencilRevisionId="00000000-0000-0000-0000-000000000000" StencilVersion="0.0"/>
+  <Id Name="System.Storyboarding.Annotation.AnimatedRectangleCallout" Revision="1" Stencil="System.Storyboarding.Annotation" StencilVersion="0.1"/>
 </Control>
 </file>
 
 <file path=customXml/item30.xml><?xml version="1.0" encoding="utf-8"?>
 <Control xmlns="http://schemas.microsoft.com/VisualStudio/2011/storyboarding/control">
-  <Id Name="System.Storyboarding.Common.CheckBoxUnchecked" Revision="1" Stencil="System.Storyboarding.Common" StencilVersion="0.1"/>
+  <Id Name="System.Storyboarding.WindowsAppIcons.Search" Revision="1" Stencil="System.Storyboarding.WindowsAppIcons" StencilVersion="0.1"/>
 </Control>
 </file>
 
@@ -23066,13 +23322,13 @@
 
 <file path=customXml/item32.xml><?xml version="1.0" encoding="utf-8"?>
 <Control xmlns="http://schemas.microsoft.com/VisualStudio/2011/storyboarding/control">
-  <Id Name="System.Storyboarding.Annotation.AnimatedRectangleCallout" Revision="1" Stencil="System.Storyboarding.Annotation" StencilVersion="0.1"/>
+  <Id Name="System.Storyboarding.WindowsApps.WindowsAppsComboBox" Revision="1" Stencil="System.Storyboarding.WindowsApps" StencilVersion="0.1"/>
 </Control>
 </file>
 
 <file path=customXml/item33.xml><?xml version="1.0" encoding="utf-8"?>
 <Control xmlns="http://schemas.microsoft.com/VisualStudio/2011/storyboarding/control">
-  <Id Name="System.Storyboarding.Annotation.StickyNote" Revision="1" Stencil="System.Storyboarding.Annotation" StencilVersion="0.1"/>
+  <Id Name="System.Storyboarding.Annotation.AnimatedRectangleCallout" Revision="1" Stencil="System.Storyboarding.Annotation" StencilVersion="0.1"/>
 </Control>
 </file>
 
@@ -23084,102 +23340,102 @@
 
 <file path=customXml/item35.xml><?xml version="1.0" encoding="utf-8"?>
 <Control xmlns="http://schemas.microsoft.com/VisualStudio/2011/storyboarding/control">
-  <Id Name="System.Storyboarding.WindowsApps.WindowsAppsEditBox" Revision="1" Stencil="System.Storyboarding.WindowsApps" StencilVersion="0.1"/>
+  <Id Name="System.Storyboarding.Common.ScrollbarVertical" Revision="1" Stencil="System.Storyboarding.Common" StencilVersion="0.1"/>
 </Control>
 </file>
 
 <file path=customXml/item36.xml><?xml version="1.0" encoding="utf-8"?>
 <Control xmlns="http://schemas.microsoft.com/VisualStudio/2011/storyboarding/control">
-  <Id Name="System.Storyboarding.WindowsApps.WindowsAppsEditBox" Revision="1" Stencil="System.Storyboarding.WindowsApps" StencilVersion="0.1"/>
+  <Id Name="System.Storyboarding.Annotation.StickyNote" Revision="1" Stencil="System.Storyboarding.Annotation" StencilVersion="0.1"/>
 </Control>
 </file>
 
 <file path=customXml/item37.xml><?xml version="1.0" encoding="utf-8"?>
 <Control xmlns="http://schemas.microsoft.com/VisualStudio/2011/storyboarding/control">
-  <Id Name="System.Storyboarding.WindowsApps.WindowsAppsComboBox" Revision="1" Stencil="System.Storyboarding.WindowsApps" StencilVersion="0.1"/>
+  <Id Name="System.Storyboarding.WindowsDesktop.Group" Revision="1" Stencil="System.Storyboarding.WindowsDesktop" StencilVersion="0.1"/>
 </Control>
 </file>
 
 <file path=customXml/item38.xml><?xml version="1.0" encoding="utf-8"?>
 <Control xmlns="http://schemas.microsoft.com/VisualStudio/2011/storyboarding/control">
-  <Id Name="2af01176-85ee-4929-8d41-a331980c979e" RevisionId="be170569-95d9-41cc-85ac-d2bbd0fbf029" Stencil="172d6d98-e5c9-42e9-a209-79f7a94bbd38" StencilRevisionId="00000000-0000-0000-0000-000000000000" StencilVersion="0.0"/>
+  <Id Name="System.Storyboarding.Common.CheckBoxChecked" Revision="1" Stencil="System.Storyboarding.Common" StencilVersion="0.1"/>
 </Control>
 </file>
 
 <file path=customXml/item39.xml><?xml version="1.0" encoding="utf-8"?>
 <Control xmlns="http://schemas.microsoft.com/VisualStudio/2011/storyboarding/control">
-  <Id Name="System.Storyboarding.WindowsApps.WindowsAppsEditBox" Revision="1" Stencil="System.Storyboarding.WindowsApps" StencilVersion="0.1"/>
+  <Id Name="System.Storyboarding.WindowsDesktop.Group" Revision="1" Stencil="System.Storyboarding.WindowsDesktop" StencilVersion="0.1"/>
 </Control>
 </file>
 
 <file path=customXml/item4.xml><?xml version="1.0" encoding="utf-8"?>
 <Control xmlns="http://schemas.microsoft.com/VisualStudio/2011/storyboarding/control">
-  <Id Name="System.Storyboarding.WindowsAppIcons.Search" Revision="1" Stencil="System.Storyboarding.WindowsAppIcons" StencilVersion="0.1"/>
+  <Id Name="System.Storyboarding.Common.CheckBoxChecked" Revision="1" Stencil="System.Storyboarding.Common" StencilVersion="0.1"/>
 </Control>
 </file>
 
 <file path=customXml/item40.xml><?xml version="1.0" encoding="utf-8"?>
 <Control xmlns="http://schemas.microsoft.com/VisualStudio/2011/storyboarding/control">
-  <Id Name="System.Storyboarding.WindowsApps.WindowsAppsEditBox" Revision="1" Stencil="System.Storyboarding.WindowsApps" StencilVersion="0.1"/>
+  <Id Name="f7a94b64-51d6-472a-8bb4-f2cc047935d1" RevisionId="4b37df06-a36b-4383-9074-55517f1335fc" Stencil="172d6d98-e5c9-42e9-a209-79f7a94bbd38" StencilRevisionId="00000000-0000-0000-0000-000000000000" StencilVersion="0.0"/>
 </Control>
 </file>
 
 <file path=customXml/item41.xml><?xml version="1.0" encoding="utf-8"?>
 <Control xmlns="http://schemas.microsoft.com/VisualStudio/2011/storyboarding/control">
-  <Id Name="System.Storyboarding.WindowsAppIcons.Save" Revision="1" Stencil="System.Storyboarding.WindowsAppIcons" StencilVersion="0.1"/>
+  <Id Name="System.Storyboarding.WindowsApps.WindowsAppsEditBox" Revision="1" Stencil="System.Storyboarding.WindowsApps" StencilVersion="0.1"/>
 </Control>
 </file>
 
 <file path=customXml/item42.xml><?xml version="1.0" encoding="utf-8"?>
 <Control xmlns="http://schemas.microsoft.com/VisualStudio/2011/storyboarding/control">
-  <Id Name="f7a94b64-51d6-472a-8bb4-f2cc047935d1" RevisionId="4b37df06-a36b-4383-9074-55517f1335fc" Stencil="172d6d98-e5c9-42e9-a209-79f7a94bbd38" StencilRevisionId="00000000-0000-0000-0000-000000000000" StencilVersion="0.0"/>
+  <Id Name="System.Storyboarding.WindowsApps.WindowsAppsEditBox" Revision="1" Stencil="System.Storyboarding.WindowsApps" StencilVersion="0.1"/>
 </Control>
 </file>
 
 <file path=customXml/item43.xml><?xml version="1.0" encoding="utf-8"?>
 <Control xmlns="http://schemas.microsoft.com/VisualStudio/2011/storyboarding/control">
-  <Id Name="System.Storyboarding.Annotation.AnimatedRectangleCallout" Revision="1" Stencil="System.Storyboarding.Annotation" StencilVersion="0.1"/>
+  <Id Name="System.Storyboarding.WindowsApps.WindowsAppsEditBox" Revision="1" Stencil="System.Storyboarding.WindowsApps" StencilVersion="0.1"/>
 </Control>
 </file>
 
 <file path=customXml/item44.xml><?xml version="1.0" encoding="utf-8"?>
 <Control xmlns="http://schemas.microsoft.com/VisualStudio/2011/storyboarding/control">
-  <Id Name="System.Storyboarding.WindowsDesktop.Group" Revision="1" Stencil="System.Storyboarding.WindowsDesktop" StencilVersion="0.1"/>
+  <Id Name="f7a94b64-51d6-472a-8bb4-f2cc047935d1" RevisionId="4b37df06-a36b-4383-9074-55517f1335fc" Stencil="172d6d98-e5c9-42e9-a209-79f7a94bbd38" StencilRevisionId="00000000-0000-0000-0000-000000000000" StencilVersion="0.0"/>
 </Control>
 </file>
 
 <file path=customXml/item5.xml><?xml version="1.0" encoding="utf-8"?>
 <Control xmlns="http://schemas.microsoft.com/VisualStudio/2011/storyboarding/control">
-  <Id Name="03ad4d9b-4b9d-44ba-9033-0000952eba9d" RevisionId="77940bd2-b573-4b5a-acef-50d9302aaf3c" Stencil="172d6d98-e5c9-42e9-a209-79f7a94bbd38" StencilRevisionId="00000000-0000-0000-0000-000000000000" StencilVersion="0.0"/>
+  <Id Name="System.Storyboarding.Common.ScrollbarVertical" Revision="1" Stencil="System.Storyboarding.Common" StencilVersion="0.1"/>
 </Control>
 </file>
 
 <file path=customXml/item6.xml><?xml version="1.0" encoding="utf-8"?>
 <Control xmlns="http://schemas.microsoft.com/VisualStudio/2011/storyboarding/control">
-  <Id Name="System.Storyboarding.WindowsAppIcons.Search" Revision="1" Stencil="System.Storyboarding.WindowsAppIcons" StencilVersion="0.1"/>
+  <Id Name="System.Storyboarding.WindowsApps.WindowsAppsEditBox" Revision="1" Stencil="System.Storyboarding.WindowsApps" StencilVersion="0.1"/>
 </Control>
 </file>
 
 <file path=customXml/item7.xml><?xml version="1.0" encoding="utf-8"?>
 <Control xmlns="http://schemas.microsoft.com/VisualStudio/2011/storyboarding/control">
-  <Id Name="System.Storyboarding.WindowsAppIcons.Filter" Revision="1" Stencil="System.Storyboarding.WindowsAppIcons" StencilVersion="0.1"/>
+  <Id Name="System.Storyboarding.Annotation.AnimatedRectangleCallout" Revision="1" Stencil="System.Storyboarding.Annotation" StencilVersion="0.1"/>
 </Control>
 </file>
 
 <file path=customXml/item8.xml><?xml version="1.0" encoding="utf-8"?>
 <Control xmlns="http://schemas.microsoft.com/VisualStudio/2011/storyboarding/control">
-  <Id Name="System.Storyboarding.Common.DatePicker" Revision="1" Stencil="System.Storyboarding.Common" StencilVersion="0.1"/>
+  <Id Name="System.Storyboarding.WindowsApps.WindowsAppsComboBox" Revision="1" Stencil="System.Storyboarding.WindowsApps" StencilVersion="0.1"/>
 </Control>
 </file>
 
 <file path=customXml/item9.xml><?xml version="1.0" encoding="utf-8"?>
 <Control xmlns="http://schemas.microsoft.com/VisualStudio/2011/storyboarding/control">
-  <Id Name="System.Storyboarding.Common.DatePicker" Revision="1" Stencil="System.Storyboarding.Common" StencilVersion="0.1"/>
+  <Id Name="System.Storyboarding.WindowsApps.WindowsAppsEditBox" Revision="1" Stencil="System.Storyboarding.WindowsApps" StencilVersion="0.1"/>
 </Control>
 </file>
 
 <file path=customXml/itemProps1.xml><?xml version="1.0" encoding="utf-8"?>
-<ds:datastoreItem xmlns:ds="http://schemas.openxmlformats.org/officeDocument/2006/customXml" ds:itemID="{5A4D65C3-0019-4CD6-A56C-AB596FC47CB6}">
+<ds:datastoreItem xmlns:ds="http://schemas.openxmlformats.org/officeDocument/2006/customXml" ds:itemID="{B0273885-341F-462A-A3D2-EB18E7C12B15}">
   <ds:schemaRefs>
     <ds:schemaRef ds:uri="http://schemas.microsoft.com/VisualStudio/2011/storyboarding/control"/>
   </ds:schemaRefs>
@@ -23187,7 +23443,7 @@
 </file>
 
 <file path=customXml/itemProps10.xml><?xml version="1.0" encoding="utf-8"?>
-<ds:datastoreItem xmlns:ds="http://schemas.openxmlformats.org/officeDocument/2006/customXml" ds:itemID="{914D39F0-13C3-468F-9078-CF1ED7F441C1}">
+<ds:datastoreItem xmlns:ds="http://schemas.openxmlformats.org/officeDocument/2006/customXml" ds:itemID="{6090C64C-C352-4038-A71D-A3C89F9ECB15}">
   <ds:schemaRefs>
     <ds:schemaRef ds:uri="http://schemas.microsoft.com/VisualStudio/2011/storyboarding/control"/>
   </ds:schemaRefs>
@@ -23195,7 +23451,7 @@
 </file>
 
 <file path=customXml/itemProps11.xml><?xml version="1.0" encoding="utf-8"?>
-<ds:datastoreItem xmlns:ds="http://schemas.openxmlformats.org/officeDocument/2006/customXml" ds:itemID="{F89AE9EA-6036-4D28-9121-37D44922D0F5}">
+<ds:datastoreItem xmlns:ds="http://schemas.openxmlformats.org/officeDocument/2006/customXml" ds:itemID="{15CD1028-5137-452F-BAD5-3BB93B44D55D}">
   <ds:schemaRefs>
     <ds:schemaRef ds:uri="http://schemas.microsoft.com/VisualStudio/2011/storyboarding/control"/>
   </ds:schemaRefs>
@@ -23203,7 +23459,7 @@
 </file>
 
 <file path=customXml/itemProps12.xml><?xml version="1.0" encoding="utf-8"?>
-<ds:datastoreItem xmlns:ds="http://schemas.openxmlformats.org/officeDocument/2006/customXml" ds:itemID="{7416464E-8551-42D6-B6EB-33E82126C8C1}">
+<ds:datastoreItem xmlns:ds="http://schemas.openxmlformats.org/officeDocument/2006/customXml" ds:itemID="{E600EE04-8BD9-4784-99F5-2819D436EF6F}">
   <ds:schemaRefs>
     <ds:schemaRef ds:uri="http://schemas.microsoft.com/VisualStudio/2011/storyboarding/control"/>
   </ds:schemaRefs>
@@ -23211,7 +23467,7 @@
 </file>
 
 <file path=customXml/itemProps13.xml><?xml version="1.0" encoding="utf-8"?>
-<ds:datastoreItem xmlns:ds="http://schemas.openxmlformats.org/officeDocument/2006/customXml" ds:itemID="{2C03665D-061C-437D-A364-6607BBD4CECC}">
+<ds:datastoreItem xmlns:ds="http://schemas.openxmlformats.org/officeDocument/2006/customXml" ds:itemID="{B6264D59-F002-44C9-8E3B-BCC427475F6C}">
   <ds:schemaRefs>
     <ds:schemaRef ds:uri="http://schemas.microsoft.com/VisualStudio/2011/storyboarding/control"/>
   </ds:schemaRefs>
@@ -23227,7 +23483,7 @@
 </file>
 
 <file path=customXml/itemProps15.xml><?xml version="1.0" encoding="utf-8"?>
-<ds:datastoreItem xmlns:ds="http://schemas.openxmlformats.org/officeDocument/2006/customXml" ds:itemID="{126EFAD7-375C-454A-8434-49558D790875}">
+<ds:datastoreItem xmlns:ds="http://schemas.openxmlformats.org/officeDocument/2006/customXml" ds:itemID="{D5217FB4-7C36-404C-B8C0-89B1C48778AE}">
   <ds:schemaRefs>
     <ds:schemaRef ds:uri="http://schemas.microsoft.com/VisualStudio/2011/storyboarding/control"/>
   </ds:schemaRefs>
@@ -23235,7 +23491,7 @@
 </file>
 
 <file path=customXml/itemProps16.xml><?xml version="1.0" encoding="utf-8"?>
-<ds:datastoreItem xmlns:ds="http://schemas.openxmlformats.org/officeDocument/2006/customXml" ds:itemID="{D041A205-8782-453A-9DA5-BCD6307F604C}">
+<ds:datastoreItem xmlns:ds="http://schemas.openxmlformats.org/officeDocument/2006/customXml" ds:itemID="{1A85E73C-9BE8-4062-997F-4CAE0C255006}">
   <ds:schemaRefs>
     <ds:schemaRef ds:uri="http://schemas.microsoft.com/VisualStudio/2011/storyboarding/control"/>
   </ds:schemaRefs>
@@ -23243,7 +23499,7 @@
 </file>
 
 <file path=customXml/itemProps17.xml><?xml version="1.0" encoding="utf-8"?>
-<ds:datastoreItem xmlns:ds="http://schemas.openxmlformats.org/officeDocument/2006/customXml" ds:itemID="{8B371429-EF57-48DB-88FB-1618CBF6AA32}">
+<ds:datastoreItem xmlns:ds="http://schemas.openxmlformats.org/officeDocument/2006/customXml" ds:itemID="{D71D3424-4636-469B-A8BA-E9AB6145E82C}">
   <ds:schemaRefs>
     <ds:schemaRef ds:uri="http://schemas.microsoft.com/VisualStudio/2011/storyboarding/control"/>
   </ds:schemaRefs>
@@ -23251,7 +23507,7 @@
 </file>
 
 <file path=customXml/itemProps18.xml><?xml version="1.0" encoding="utf-8"?>
-<ds:datastoreItem xmlns:ds="http://schemas.openxmlformats.org/officeDocument/2006/customXml" ds:itemID="{26C4A927-1BBC-493C-B118-8C5F5B4EE2FD}">
+<ds:datastoreItem xmlns:ds="http://schemas.openxmlformats.org/officeDocument/2006/customXml" ds:itemID="{A5488CF7-C05E-41FE-86C4-195AC108C9BA}">
   <ds:schemaRefs>
     <ds:schemaRef ds:uri="http://schemas.microsoft.com/VisualStudio/2011/storyboarding/control"/>
   </ds:schemaRefs>
@@ -23259,7 +23515,7 @@
 </file>
 
 <file path=customXml/itemProps19.xml><?xml version="1.0" encoding="utf-8"?>
-<ds:datastoreItem xmlns:ds="http://schemas.openxmlformats.org/officeDocument/2006/customXml" ds:itemID="{15CD1028-5137-452F-BAD5-3BB93B44D55D}">
+<ds:datastoreItem xmlns:ds="http://schemas.openxmlformats.org/officeDocument/2006/customXml" ds:itemID="{11C33365-CEEA-4B7B-9395-9553AD6320F7}">
   <ds:schemaRefs>
     <ds:schemaRef ds:uri="http://schemas.microsoft.com/VisualStudio/2011/storyboarding/control"/>
   </ds:schemaRefs>
@@ -23275,6 +23531,62 @@
 </file>
 
 <file path=customXml/itemProps20.xml><?xml version="1.0" encoding="utf-8"?>
+<ds:datastoreItem xmlns:ds="http://schemas.openxmlformats.org/officeDocument/2006/customXml" ds:itemID="{075698AD-C9E8-493A-B6B1-D397B0A80F13}">
+  <ds:schemaRefs>
+    <ds:schemaRef ds:uri="http://schemas.microsoft.com/VisualStudio/2011/storyboarding/control"/>
+  </ds:schemaRefs>
+</ds:datastoreItem>
+</file>
+
+<file path=customXml/itemProps21.xml><?xml version="1.0" encoding="utf-8"?>
+<ds:datastoreItem xmlns:ds="http://schemas.openxmlformats.org/officeDocument/2006/customXml" ds:itemID="{EB713E7C-7146-48D2-BEA2-BBB31A5A0441}">
+  <ds:schemaRefs>
+    <ds:schemaRef ds:uri="http://schemas.microsoft.com/VisualStudio/2011/storyboarding/control"/>
+  </ds:schemaRefs>
+</ds:datastoreItem>
+</file>
+
+<file path=customXml/itemProps22.xml><?xml version="1.0" encoding="utf-8"?>
+<ds:datastoreItem xmlns:ds="http://schemas.openxmlformats.org/officeDocument/2006/customXml" ds:itemID="{7416464E-8551-42D6-B6EB-33E82126C8C1}">
+  <ds:schemaRefs>
+    <ds:schemaRef ds:uri="http://schemas.microsoft.com/VisualStudio/2011/storyboarding/control"/>
+  </ds:schemaRefs>
+</ds:datastoreItem>
+</file>
+
+<file path=customXml/itemProps23.xml><?xml version="1.0" encoding="utf-8"?>
+<ds:datastoreItem xmlns:ds="http://schemas.openxmlformats.org/officeDocument/2006/customXml" ds:itemID="{8B371429-EF57-48DB-88FB-1618CBF6AA32}">
+  <ds:schemaRefs>
+    <ds:schemaRef ds:uri="http://schemas.microsoft.com/VisualStudio/2011/storyboarding/control"/>
+  </ds:schemaRefs>
+</ds:datastoreItem>
+</file>
+
+<file path=customXml/itemProps24.xml><?xml version="1.0" encoding="utf-8"?>
+<ds:datastoreItem xmlns:ds="http://schemas.openxmlformats.org/officeDocument/2006/customXml" ds:itemID="{1C1B10A8-4A1C-4B72-8E86-6F825E2955B1}">
+  <ds:schemaRefs>
+    <ds:schemaRef ds:uri="http://schemas.microsoft.com/VisualStudio/2011/storyboarding/control"/>
+  </ds:schemaRefs>
+</ds:datastoreItem>
+</file>
+
+<file path=customXml/itemProps25.xml><?xml version="1.0" encoding="utf-8"?>
+<ds:datastoreItem xmlns:ds="http://schemas.openxmlformats.org/officeDocument/2006/customXml" ds:itemID="{18316B09-4A43-4F44-9599-C21C29C8D0F9}">
+  <ds:schemaRefs>
+    <ds:schemaRef ds:uri="http://schemas.microsoft.com/VisualStudio/2011/storyboarding/control"/>
+  </ds:schemaRefs>
+</ds:datastoreItem>
+</file>
+
+<file path=customXml/itemProps26.xml><?xml version="1.0" encoding="utf-8"?>
+<ds:datastoreItem xmlns:ds="http://schemas.openxmlformats.org/officeDocument/2006/customXml" ds:itemID="{1FF35713-C734-4162-A7A2-5AA54D882D4D}">
+  <ds:schemaRefs>
+    <ds:schemaRef ds:uri="http://schemas.microsoft.com/VisualStudio/2011/storyboarding/control"/>
+  </ds:schemaRefs>
+</ds:datastoreItem>
+</file>
+
+<file path=customXml/itemProps27.xml><?xml version="1.0" encoding="utf-8"?>
 <ds:datastoreItem xmlns:ds="http://schemas.openxmlformats.org/officeDocument/2006/customXml" ds:itemID="{0909C5DE-EB0D-464A-8C30-AC8168945B16}">
   <ds:schemaRefs>
     <ds:schemaRef ds:uri="http://schemas.microsoft.com/VisualStudio/2011/storyboarding/control"/>
@@ -23282,7 +23594,135 @@
 </ds:datastoreItem>
 </file>
 
-<file path=customXml/itemProps21.xml><?xml version="1.0" encoding="utf-8"?>
+<file path=customXml/itemProps28.xml><?xml version="1.0" encoding="utf-8"?>
+<ds:datastoreItem xmlns:ds="http://schemas.openxmlformats.org/officeDocument/2006/customXml" ds:itemID="{D47B9877-8121-4A5C-8672-EBAD68E41FC8}">
+  <ds:schemaRefs>
+    <ds:schemaRef ds:uri="http://schemas.microsoft.com/VisualStudio/2011/storyboarding/control"/>
+  </ds:schemaRefs>
+</ds:datastoreItem>
+</file>
+
+<file path=customXml/itemProps29.xml><?xml version="1.0" encoding="utf-8"?>
+<ds:datastoreItem xmlns:ds="http://schemas.openxmlformats.org/officeDocument/2006/customXml" ds:itemID="{5A4D65C3-0019-4CD6-A56C-AB596FC47CB6}">
+  <ds:schemaRefs>
+    <ds:schemaRef ds:uri="http://schemas.microsoft.com/VisualStudio/2011/storyboarding/control"/>
+  </ds:schemaRefs>
+</ds:datastoreItem>
+</file>
+
+<file path=customXml/itemProps3.xml><?xml version="1.0" encoding="utf-8"?>
+<ds:datastoreItem xmlns:ds="http://schemas.openxmlformats.org/officeDocument/2006/customXml" ds:itemID="{D041A205-8782-453A-9DA5-BCD6307F604C}">
+  <ds:schemaRefs>
+    <ds:schemaRef ds:uri="http://schemas.microsoft.com/VisualStudio/2011/storyboarding/control"/>
+  </ds:schemaRefs>
+</ds:datastoreItem>
+</file>
+
+<file path=customXml/itemProps30.xml><?xml version="1.0" encoding="utf-8"?>
+<ds:datastoreItem xmlns:ds="http://schemas.openxmlformats.org/officeDocument/2006/customXml" ds:itemID="{F4ED7C87-B6C1-4398-921C-6C1FDFBC2F12}">
+  <ds:schemaRefs>
+    <ds:schemaRef ds:uri="http://schemas.microsoft.com/VisualStudio/2011/storyboarding/control"/>
+  </ds:schemaRefs>
+</ds:datastoreItem>
+</file>
+
+<file path=customXml/itemProps31.xml><?xml version="1.0" encoding="utf-8"?>
+<ds:datastoreItem xmlns:ds="http://schemas.openxmlformats.org/officeDocument/2006/customXml" ds:itemID="{126EFAD7-375C-454A-8434-49558D790875}">
+  <ds:schemaRefs>
+    <ds:schemaRef ds:uri="http://schemas.microsoft.com/VisualStudio/2011/storyboarding/control"/>
+  </ds:schemaRefs>
+</ds:datastoreItem>
+</file>
+
+<file path=customXml/itemProps32.xml><?xml version="1.0" encoding="utf-8"?>
+<ds:datastoreItem xmlns:ds="http://schemas.openxmlformats.org/officeDocument/2006/customXml" ds:itemID="{D5E218A4-BD81-4546-A030-4D062A9D32A0}">
+  <ds:schemaRefs>
+    <ds:schemaRef ds:uri="http://schemas.microsoft.com/VisualStudio/2011/storyboarding/control"/>
+  </ds:schemaRefs>
+</ds:datastoreItem>
+</file>
+
+<file path=customXml/itemProps33.xml><?xml version="1.0" encoding="utf-8"?>
+<ds:datastoreItem xmlns:ds="http://schemas.openxmlformats.org/officeDocument/2006/customXml" ds:itemID="{D77F9BE1-E5DE-43BF-B0C5-DD18A05CBE05}">
+  <ds:schemaRefs>
+    <ds:schemaRef ds:uri="http://schemas.microsoft.com/VisualStudio/2011/storyboarding/control"/>
+  </ds:schemaRefs>
+</ds:datastoreItem>
+</file>
+
+<file path=customXml/itemProps34.xml><?xml version="1.0" encoding="utf-8"?>
+<ds:datastoreItem xmlns:ds="http://schemas.openxmlformats.org/officeDocument/2006/customXml" ds:itemID="{C440B9D1-59F5-4E93-99BA-31F612705752}">
+  <ds:schemaRefs>
+    <ds:schemaRef ds:uri="http://schemas.microsoft.com/VisualStudio/2011/storyboarding/control"/>
+  </ds:schemaRefs>
+</ds:datastoreItem>
+</file>
+
+<file path=customXml/itemProps35.xml><?xml version="1.0" encoding="utf-8"?>
+<ds:datastoreItem xmlns:ds="http://schemas.openxmlformats.org/officeDocument/2006/customXml" ds:itemID="{914D39F0-13C3-468F-9078-CF1ED7F441C1}">
+  <ds:schemaRefs>
+    <ds:schemaRef ds:uri="http://schemas.microsoft.com/VisualStudio/2011/storyboarding/control"/>
+  </ds:schemaRefs>
+</ds:datastoreItem>
+</file>
+
+<file path=customXml/itemProps36.xml><?xml version="1.0" encoding="utf-8"?>
+<ds:datastoreItem xmlns:ds="http://schemas.openxmlformats.org/officeDocument/2006/customXml" ds:itemID="{A241BFA6-927C-4EF6-8003-57E10DB61ABD}">
+  <ds:schemaRefs>
+    <ds:schemaRef ds:uri="http://schemas.microsoft.com/VisualStudio/2011/storyboarding/control"/>
+  </ds:schemaRefs>
+</ds:datastoreItem>
+</file>
+
+<file path=customXml/itemProps37.xml><?xml version="1.0" encoding="utf-8"?>
+<ds:datastoreItem xmlns:ds="http://schemas.openxmlformats.org/officeDocument/2006/customXml" ds:itemID="{B0904329-59C2-44A5-AFEA-401E295AF044}">
+  <ds:schemaRefs>
+    <ds:schemaRef ds:uri="http://schemas.microsoft.com/VisualStudio/2011/storyboarding/control"/>
+  </ds:schemaRefs>
+</ds:datastoreItem>
+</file>
+
+<file path=customXml/itemProps38.xml><?xml version="1.0" encoding="utf-8"?>
+<ds:datastoreItem xmlns:ds="http://schemas.openxmlformats.org/officeDocument/2006/customXml" ds:itemID="{2C03665D-061C-437D-A364-6607BBD4CECC}">
+  <ds:schemaRefs>
+    <ds:schemaRef ds:uri="http://schemas.microsoft.com/VisualStudio/2011/storyboarding/control"/>
+  </ds:schemaRefs>
+</ds:datastoreItem>
+</file>
+
+<file path=customXml/itemProps39.xml><?xml version="1.0" encoding="utf-8"?>
+<ds:datastoreItem xmlns:ds="http://schemas.openxmlformats.org/officeDocument/2006/customXml" ds:itemID="{26C4A927-1BBC-493C-B118-8C5F5B4EE2FD}">
+  <ds:schemaRefs>
+    <ds:schemaRef ds:uri="http://schemas.microsoft.com/VisualStudio/2011/storyboarding/control"/>
+  </ds:schemaRefs>
+</ds:datastoreItem>
+</file>
+
+<file path=customXml/itemProps4.xml><?xml version="1.0" encoding="utf-8"?>
+<ds:datastoreItem xmlns:ds="http://schemas.openxmlformats.org/officeDocument/2006/customXml" ds:itemID="{F7B2038E-CD36-4E5C-9495-7CB99E8BEC09}">
+  <ds:schemaRefs>
+    <ds:schemaRef ds:uri="http://schemas.microsoft.com/VisualStudio/2011/storyboarding/control"/>
+  </ds:schemaRefs>
+</ds:datastoreItem>
+</file>
+
+<file path=customXml/itemProps40.xml><?xml version="1.0" encoding="utf-8"?>
+<ds:datastoreItem xmlns:ds="http://schemas.openxmlformats.org/officeDocument/2006/customXml" ds:itemID="{73CF1057-C731-45E3-ABF5-D83CE428C19D}">
+  <ds:schemaRefs>
+    <ds:schemaRef ds:uri="http://schemas.microsoft.com/VisualStudio/2011/storyboarding/control"/>
+  </ds:schemaRefs>
+</ds:datastoreItem>
+</file>
+
+<file path=customXml/itemProps41.xml><?xml version="1.0" encoding="utf-8"?>
+<ds:datastoreItem xmlns:ds="http://schemas.openxmlformats.org/officeDocument/2006/customXml" ds:itemID="{FBB57F93-A30D-4334-B6B4-BA4B6C0CB304}">
+  <ds:schemaRefs>
+    <ds:schemaRef ds:uri="http://schemas.microsoft.com/VisualStudio/2011/storyboarding/control"/>
+  </ds:schemaRefs>
+</ds:datastoreItem>
+</file>
+
+<file path=customXml/itemProps42.xml><?xml version="1.0" encoding="utf-8"?>
 <ds:datastoreItem xmlns:ds="http://schemas.openxmlformats.org/officeDocument/2006/customXml" ds:itemID="{959A000C-E585-439F-B645-BFCCB3A28948}">
   <ds:schemaRefs>
     <ds:schemaRef ds:uri="http://schemas.microsoft.com/VisualStudio/2011/storyboarding/control"/>
@@ -23290,23 +23730,31 @@
 </ds:datastoreItem>
 </file>
 
-<file path=customXml/itemProps22.xml><?xml version="1.0" encoding="utf-8"?>
-<ds:datastoreItem xmlns:ds="http://schemas.openxmlformats.org/officeDocument/2006/customXml" ds:itemID="{D5217FB4-7C36-404C-B8C0-89B1C48778AE}">
+<file path=customXml/itemProps43.xml><?xml version="1.0" encoding="utf-8"?>
+<ds:datastoreItem xmlns:ds="http://schemas.openxmlformats.org/officeDocument/2006/customXml" ds:itemID="{A3650C13-256B-4C2A-890A-A31C00DF7823}">
   <ds:schemaRefs>
     <ds:schemaRef ds:uri="http://schemas.microsoft.com/VisualStudio/2011/storyboarding/control"/>
   </ds:schemaRefs>
 </ds:datastoreItem>
 </file>
 
-<file path=customXml/itemProps23.xml><?xml version="1.0" encoding="utf-8"?>
-<ds:datastoreItem xmlns:ds="http://schemas.openxmlformats.org/officeDocument/2006/customXml" ds:itemID="{D5E218A4-BD81-4546-A030-4D062A9D32A0}">
+<file path=customXml/itemProps44.xml><?xml version="1.0" encoding="utf-8"?>
+<ds:datastoreItem xmlns:ds="http://schemas.openxmlformats.org/officeDocument/2006/customXml" ds:itemID="{EB310673-AE6D-457F-B065-E26CB97B2FBC}">
   <ds:schemaRefs>
     <ds:schemaRef ds:uri="http://schemas.microsoft.com/VisualStudio/2011/storyboarding/control"/>
   </ds:schemaRefs>
 </ds:datastoreItem>
 </file>
 
-<file path=customXml/itemProps24.xml><?xml version="1.0" encoding="utf-8"?>
+<file path=customXml/itemProps5.xml><?xml version="1.0" encoding="utf-8"?>
+<ds:datastoreItem xmlns:ds="http://schemas.openxmlformats.org/officeDocument/2006/customXml" ds:itemID="{F89AE9EA-6036-4D28-9121-37D44922D0F5}">
+  <ds:schemaRefs>
+    <ds:schemaRef ds:uri="http://schemas.microsoft.com/VisualStudio/2011/storyboarding/control"/>
+  </ds:schemaRefs>
+</ds:datastoreItem>
+</file>
+
+<file path=customXml/itemProps6.xml><?xml version="1.0" encoding="utf-8"?>
 <ds:datastoreItem xmlns:ds="http://schemas.openxmlformats.org/officeDocument/2006/customXml" ds:itemID="{84D473BB-BA7F-4027-9C4E-A00D65AC41B0}">
   <ds:schemaRefs>
     <ds:schemaRef ds:uri="http://schemas.microsoft.com/VisualStudio/2011/storyboarding/control"/>
@@ -23314,71 +23762,7 @@
 </ds:datastoreItem>
 </file>
 
-<file path=customXml/itemProps25.xml><?xml version="1.0" encoding="utf-8"?>
-<ds:datastoreItem xmlns:ds="http://schemas.openxmlformats.org/officeDocument/2006/customXml" ds:itemID="{1C1B10A8-4A1C-4B72-8E86-6F825E2955B1}">
-  <ds:schemaRefs>
-    <ds:schemaRef ds:uri="http://schemas.microsoft.com/VisualStudio/2011/storyboarding/control"/>
-  </ds:schemaRefs>
-</ds:datastoreItem>
-</file>
-
-<file path=customXml/itemProps26.xml><?xml version="1.0" encoding="utf-8"?>
-<ds:datastoreItem xmlns:ds="http://schemas.openxmlformats.org/officeDocument/2006/customXml" ds:itemID="{73CF1057-C731-45E3-ABF5-D83CE428C19D}">
-  <ds:schemaRefs>
-    <ds:schemaRef ds:uri="http://schemas.microsoft.com/VisualStudio/2011/storyboarding/control"/>
-  </ds:schemaRefs>
-</ds:datastoreItem>
-</file>
-
-<file path=customXml/itemProps27.xml><?xml version="1.0" encoding="utf-8"?>
-<ds:datastoreItem xmlns:ds="http://schemas.openxmlformats.org/officeDocument/2006/customXml" ds:itemID="{1A85E73C-9BE8-4062-997F-4CAE0C255006}">
-  <ds:schemaRefs>
-    <ds:schemaRef ds:uri="http://schemas.microsoft.com/VisualStudio/2011/storyboarding/control"/>
-  </ds:schemaRefs>
-</ds:datastoreItem>
-</file>
-
-<file path=customXml/itemProps28.xml><?xml version="1.0" encoding="utf-8"?>
-<ds:datastoreItem xmlns:ds="http://schemas.openxmlformats.org/officeDocument/2006/customXml" ds:itemID="{D77F9BE1-E5DE-43BF-B0C5-DD18A05CBE05}">
-  <ds:schemaRefs>
-    <ds:schemaRef ds:uri="http://schemas.microsoft.com/VisualStudio/2011/storyboarding/control"/>
-  </ds:schemaRefs>
-</ds:datastoreItem>
-</file>
-
-<file path=customXml/itemProps29.xml><?xml version="1.0" encoding="utf-8"?>
-<ds:datastoreItem xmlns:ds="http://schemas.openxmlformats.org/officeDocument/2006/customXml" ds:itemID="{F7B2038E-CD36-4E5C-9495-7CB99E8BEC09}">
-  <ds:schemaRefs>
-    <ds:schemaRef ds:uri="http://schemas.microsoft.com/VisualStudio/2011/storyboarding/control"/>
-  </ds:schemaRefs>
-</ds:datastoreItem>
-</file>
-
-<file path=customXml/itemProps3.xml><?xml version="1.0" encoding="utf-8"?>
-<ds:datastoreItem xmlns:ds="http://schemas.openxmlformats.org/officeDocument/2006/customXml" ds:itemID="{EB713E7C-7146-48D2-BEA2-BBB31A5A0441}">
-  <ds:schemaRefs>
-    <ds:schemaRef ds:uri="http://schemas.microsoft.com/VisualStudio/2011/storyboarding/control"/>
-  </ds:schemaRefs>
-</ds:datastoreItem>
-</file>
-
-<file path=customXml/itemProps30.xml><?xml version="1.0" encoding="utf-8"?>
-<ds:datastoreItem xmlns:ds="http://schemas.openxmlformats.org/officeDocument/2006/customXml" ds:itemID="{D71D3424-4636-469B-A8BA-E9AB6145E82C}">
-  <ds:schemaRefs>
-    <ds:schemaRef ds:uri="http://schemas.microsoft.com/VisualStudio/2011/storyboarding/control"/>
-  </ds:schemaRefs>
-</ds:datastoreItem>
-</file>
-
-<file path=customXml/itemProps31.xml><?xml version="1.0" encoding="utf-8"?>
-<ds:datastoreItem xmlns:ds="http://schemas.openxmlformats.org/officeDocument/2006/customXml" ds:itemID="{A241BFA6-927C-4EF6-8003-57E10DB61ABD}">
-  <ds:schemaRefs>
-    <ds:schemaRef ds:uri="http://schemas.microsoft.com/VisualStudio/2011/storyboarding/control"/>
-  </ds:schemaRefs>
-</ds:datastoreItem>
-</file>
-
-<file path=customXml/itemProps32.xml><?xml version="1.0" encoding="utf-8"?>
+<file path=customXml/itemProps7.xml><?xml version="1.0" encoding="utf-8"?>
 <ds:datastoreItem xmlns:ds="http://schemas.openxmlformats.org/officeDocument/2006/customXml" ds:itemID="{73258906-5B90-4F9D-843C-5ADD1287EE53}">
   <ds:schemaRefs>
     <ds:schemaRef ds:uri="http://schemas.microsoft.com/VisualStudio/2011/storyboarding/control"/>
@@ -23386,39 +23770,7 @@
 </ds:datastoreItem>
 </file>
 
-<file path=customXml/itemProps33.xml><?xml version="1.0" encoding="utf-8"?>
-<ds:datastoreItem xmlns:ds="http://schemas.openxmlformats.org/officeDocument/2006/customXml" ds:itemID="{18316B09-4A43-4F44-9599-C21C29C8D0F9}">
-  <ds:schemaRefs>
-    <ds:schemaRef ds:uri="http://schemas.microsoft.com/VisualStudio/2011/storyboarding/control"/>
-  </ds:schemaRefs>
-</ds:datastoreItem>
-</file>
-
-<file path=customXml/itemProps34.xml><?xml version="1.0" encoding="utf-8"?>
-<ds:datastoreItem xmlns:ds="http://schemas.openxmlformats.org/officeDocument/2006/customXml" ds:itemID="{A3650C13-256B-4C2A-890A-A31C00DF7823}">
-  <ds:schemaRefs>
-    <ds:schemaRef ds:uri="http://schemas.microsoft.com/VisualStudio/2011/storyboarding/control"/>
-  </ds:schemaRefs>
-</ds:datastoreItem>
-</file>
-
-<file path=customXml/itemProps35.xml><?xml version="1.0" encoding="utf-8"?>
-<ds:datastoreItem xmlns:ds="http://schemas.openxmlformats.org/officeDocument/2006/customXml" ds:itemID="{A5488CF7-C05E-41FE-86C4-195AC108C9BA}">
-  <ds:schemaRefs>
-    <ds:schemaRef ds:uri="http://schemas.microsoft.com/VisualStudio/2011/storyboarding/control"/>
-  </ds:schemaRefs>
-</ds:datastoreItem>
-</file>
-
-<file path=customXml/itemProps36.xml><?xml version="1.0" encoding="utf-8"?>
-<ds:datastoreItem xmlns:ds="http://schemas.openxmlformats.org/officeDocument/2006/customXml" ds:itemID="{C440B9D1-59F5-4E93-99BA-31F612705752}">
-  <ds:schemaRefs>
-    <ds:schemaRef ds:uri="http://schemas.microsoft.com/VisualStudio/2011/storyboarding/control"/>
-  </ds:schemaRefs>
-</ds:datastoreItem>
-</file>
-
-<file path=customXml/itemProps37.xml><?xml version="1.0" encoding="utf-8"?>
+<file path=customXml/itemProps8.xml><?xml version="1.0" encoding="utf-8"?>
 <ds:datastoreItem xmlns:ds="http://schemas.openxmlformats.org/officeDocument/2006/customXml" ds:itemID="{671B2219-7BB9-410E-8E61-FAF513D1D6E4}">
   <ds:schemaRefs>
     <ds:schemaRef ds:uri="http://schemas.microsoft.com/VisualStudio/2011/storyboarding/control"/>
@@ -23426,106 +23778,10 @@
 </ds:datastoreItem>
 </file>
 
-<file path=customXml/itemProps38.xml><?xml version="1.0" encoding="utf-8"?>
-<ds:datastoreItem xmlns:ds="http://schemas.openxmlformats.org/officeDocument/2006/customXml" ds:itemID="{1FF35713-C734-4162-A7A2-5AA54D882D4D}">
-  <ds:schemaRefs>
-    <ds:schemaRef ds:uri="http://schemas.microsoft.com/VisualStudio/2011/storyboarding/control"/>
-  </ds:schemaRefs>
-</ds:datastoreItem>
-</file>
-
-<file path=customXml/itemProps39.xml><?xml version="1.0" encoding="utf-8"?>
-<ds:datastoreItem xmlns:ds="http://schemas.openxmlformats.org/officeDocument/2006/customXml" ds:itemID="{FBB57F93-A30D-4334-B6B4-BA4B6C0CB304}">
-  <ds:schemaRefs>
-    <ds:schemaRef ds:uri="http://schemas.microsoft.com/VisualStudio/2011/storyboarding/control"/>
-  </ds:schemaRefs>
-</ds:datastoreItem>
-</file>
-
-<file path=customXml/itemProps4.xml><?xml version="1.0" encoding="utf-8"?>
-<ds:datastoreItem xmlns:ds="http://schemas.openxmlformats.org/officeDocument/2006/customXml" ds:itemID="{E600EE04-8BD9-4784-99F5-2819D436EF6F}">
-  <ds:schemaRefs>
-    <ds:schemaRef ds:uri="http://schemas.microsoft.com/VisualStudio/2011/storyboarding/control"/>
-  </ds:schemaRefs>
-</ds:datastoreItem>
-</file>
-
-<file path=customXml/itemProps40.xml><?xml version="1.0" encoding="utf-8"?>
+<file path=customXml/itemProps9.xml><?xml version="1.0" encoding="utf-8"?>
 <ds:datastoreItem xmlns:ds="http://schemas.openxmlformats.org/officeDocument/2006/customXml" ds:itemID="{B8D388F9-F664-4C87-974C-7A1E6B9CD7CD}">
   <ds:schemaRefs>
     <ds:schemaRef ds:uri="http://schemas.microsoft.com/VisualStudio/2011/storyboarding/control"/>
   </ds:schemaRefs>
 </ds:datastoreItem>
-</file>
-
-<file path=customXml/itemProps41.xml><?xml version="1.0" encoding="utf-8"?>
-<ds:datastoreItem xmlns:ds="http://schemas.openxmlformats.org/officeDocument/2006/customXml" ds:itemID="{D47B9877-8121-4A5C-8672-EBAD68E41FC8}">
-  <ds:schemaRefs>
-    <ds:schemaRef ds:uri="http://schemas.microsoft.com/VisualStudio/2011/storyboarding/control"/>
-  </ds:schemaRefs>
-</ds:datastoreItem>
-</file>
-
-<file path=customXml/itemProps42.xml><?xml version="1.0" encoding="utf-8"?>
-<ds:datastoreItem xmlns:ds="http://schemas.openxmlformats.org/officeDocument/2006/customXml" ds:itemID="{EB310673-AE6D-457F-B065-E26CB97B2FBC}">
-  <ds:schemaRefs>
-    <ds:schemaRef ds:uri="http://schemas.microsoft.com/VisualStudio/2011/storyboarding/control"/>
-  </ds:schemaRefs>
-</ds:datastoreItem>
-</file>
-
-<file path=customXml/itemProps43.xml><?xml version="1.0" encoding="utf-8"?>
-<ds:datastoreItem xmlns:ds="http://schemas.openxmlformats.org/officeDocument/2006/customXml" ds:itemID="{11C33365-CEEA-4B7B-9395-9553AD6320F7}">
-  <ds:schemaRefs>
-    <ds:schemaRef ds:uri="http://schemas.microsoft.com/VisualStudio/2011/storyboarding/control"/>
-  </ds:schemaRefs>
-</ds:datastoreItem>
-</file>
-
-<file path=customXml/itemProps44.xml><?xml version="1.0" encoding="utf-8"?>
-<ds:datastoreItem xmlns:ds="http://schemas.openxmlformats.org/officeDocument/2006/customXml" ds:itemID="{B0904329-59C2-44A5-AFEA-401E295AF044}">
-  <ds:schemaRefs>
-    <ds:schemaRef ds:uri="http://schemas.microsoft.com/VisualStudio/2011/storyboarding/control"/>
-  </ds:schemaRefs>
-</ds:datastoreItem>
-</file>
-
-<file path=customXml/itemProps5.xml><?xml version="1.0" encoding="utf-8"?>
-<ds:datastoreItem xmlns:ds="http://schemas.openxmlformats.org/officeDocument/2006/customXml" ds:itemID="{6090C64C-C352-4038-A71D-A3C89F9ECB15}">
-  <ds:schemaRefs>
-    <ds:schemaRef ds:uri="http://schemas.microsoft.com/VisualStudio/2011/storyboarding/control"/>
-  </ds:schemaRefs>
-</ds:datastoreItem>
-</file>
-
-<file path=customXml/itemProps6.xml><?xml version="1.0" encoding="utf-8"?>
-<ds:datastoreItem xmlns:ds="http://schemas.openxmlformats.org/officeDocument/2006/customXml" ds:itemID="{F4ED7C87-B6C1-4398-921C-6C1FDFBC2F12}">
-  <ds:schemaRefs>
-    <ds:schemaRef ds:uri="http://schemas.microsoft.com/VisualStudio/2011/storyboarding/control"/>
-  </ds:schemaRefs>
-</ds:datastoreItem>
-</file>
-
-<file path=customXml/itemProps7.xml><?xml version="1.0" encoding="utf-8"?>
-<ds:datastoreItem xmlns:ds="http://schemas.openxmlformats.org/officeDocument/2006/customXml" ds:itemID="{B0273885-341F-462A-A3D2-EB18E7C12B15}">
-  <ds:schemaRefs>
-    <ds:schemaRef ds:uri="http://schemas.microsoft.com/VisualStudio/2011/storyboarding/control"/>
-  </ds:schemaRefs>
-</ds:datastoreItem>
-</file>
-
-<file path=customXml/itemProps8.xml><?xml version="1.0" encoding="utf-8"?>
-<ds:datastoreItem xmlns:ds="http://schemas.openxmlformats.org/officeDocument/2006/customXml" ds:itemID="{075698AD-C9E8-493A-B6B1-D397B0A80F13}">
-  <ds:schemaRefs>
-    <ds:schemaRef ds:uri="http://schemas.microsoft.com/VisualStudio/2011/storyboarding/control"/>
-  </ds:schemaRefs>
-</ds:datastoreItem>
-</file>
-
-<file path=customXml/itemProps9.xml><?xml version="1.0" encoding="utf-8"?>
-<ds:datastoreItem xmlns:ds="http://schemas.openxmlformats.org/officeDocument/2006/customXml" ds:itemID="{B6264D59-F002-44C9-8E3B-BCC427475F6C}">
-  <ds:schemaRefs>
-    <ds:schemaRef ds:uri="http://schemas.microsoft.com/VisualStudio/2011/storyboarding/control"/>
-  </ds:schemaRefs>
-</ds:datastoreItem>
 </file>
</xml_diff>